<commit_message>
Updated model diagram and changes to Dev guide
</commit_message>
<xml_diff>
--- a/docs/diagrams/ModelComponentClassBetterOopDiagram.pptx
+++ b/docs/diagrams/ModelComponentClassBetterOopDiagram.pptx
@@ -208,7 +208,7 @@
           <a:p>
             <a:fld id="{F5CC4B3F-88C1-4FFA-B1B6-F41C21DC6924}" type="datetimeFigureOut">
               <a:rPr lang="en-US" smtClean="0"/>
-              <a:t>6/27/2018</a:t>
+              <a:t>11/11/2018</a:t>
             </a:fld>
             <a:endParaRPr lang="en-US"/>
           </a:p>
@@ -654,7 +654,7 @@
           <a:p>
             <a:fld id="{78C97017-6FC3-485B-9764-EAC9E56C1D49}" type="datetimeFigureOut">
               <a:rPr lang="en-US" smtClean="0"/>
-              <a:t>6/27/2018</a:t>
+              <a:t>11/11/2018</a:t>
             </a:fld>
             <a:endParaRPr lang="en-US"/>
           </a:p>
@@ -822,7 +822,7 @@
           <a:p>
             <a:fld id="{78C97017-6FC3-485B-9764-EAC9E56C1D49}" type="datetimeFigureOut">
               <a:rPr lang="en-US" smtClean="0"/>
-              <a:t>6/27/2018</a:t>
+              <a:t>11/11/2018</a:t>
             </a:fld>
             <a:endParaRPr lang="en-US"/>
           </a:p>
@@ -1000,7 +1000,7 @@
           <a:p>
             <a:fld id="{78C97017-6FC3-485B-9764-EAC9E56C1D49}" type="datetimeFigureOut">
               <a:rPr lang="en-US" smtClean="0"/>
-              <a:t>6/27/2018</a:t>
+              <a:t>11/11/2018</a:t>
             </a:fld>
             <a:endParaRPr lang="en-US"/>
           </a:p>
@@ -1168,7 +1168,7 @@
           <a:p>
             <a:fld id="{78C97017-6FC3-485B-9764-EAC9E56C1D49}" type="datetimeFigureOut">
               <a:rPr lang="en-US" smtClean="0"/>
-              <a:t>6/27/2018</a:t>
+              <a:t>11/11/2018</a:t>
             </a:fld>
             <a:endParaRPr lang="en-US"/>
           </a:p>
@@ -1413,7 +1413,7 @@
           <a:p>
             <a:fld id="{78C97017-6FC3-485B-9764-EAC9E56C1D49}" type="datetimeFigureOut">
               <a:rPr lang="en-US" smtClean="0"/>
-              <a:t>6/27/2018</a:t>
+              <a:t>11/11/2018</a:t>
             </a:fld>
             <a:endParaRPr lang="en-US"/>
           </a:p>
@@ -1698,7 +1698,7 @@
           <a:p>
             <a:fld id="{78C97017-6FC3-485B-9764-EAC9E56C1D49}" type="datetimeFigureOut">
               <a:rPr lang="en-US" smtClean="0"/>
-              <a:t>6/27/2018</a:t>
+              <a:t>11/11/2018</a:t>
             </a:fld>
             <a:endParaRPr lang="en-US"/>
           </a:p>
@@ -2117,7 +2117,7 @@
           <a:p>
             <a:fld id="{78C97017-6FC3-485B-9764-EAC9E56C1D49}" type="datetimeFigureOut">
               <a:rPr lang="en-US" smtClean="0"/>
-              <a:t>6/27/2018</a:t>
+              <a:t>11/11/2018</a:t>
             </a:fld>
             <a:endParaRPr lang="en-US"/>
           </a:p>
@@ -2234,7 +2234,7 @@
           <a:p>
             <a:fld id="{78C97017-6FC3-485B-9764-EAC9E56C1D49}" type="datetimeFigureOut">
               <a:rPr lang="en-US" smtClean="0"/>
-              <a:t>6/27/2018</a:t>
+              <a:t>11/11/2018</a:t>
             </a:fld>
             <a:endParaRPr lang="en-US"/>
           </a:p>
@@ -2329,7 +2329,7 @@
           <a:p>
             <a:fld id="{78C97017-6FC3-485B-9764-EAC9E56C1D49}" type="datetimeFigureOut">
               <a:rPr lang="en-US" smtClean="0"/>
-              <a:t>6/27/2018</a:t>
+              <a:t>11/11/2018</a:t>
             </a:fld>
             <a:endParaRPr lang="en-US"/>
           </a:p>
@@ -2604,7 +2604,7 @@
           <a:p>
             <a:fld id="{78C97017-6FC3-485B-9764-EAC9E56C1D49}" type="datetimeFigureOut">
               <a:rPr lang="en-US" smtClean="0"/>
-              <a:t>6/27/2018</a:t>
+              <a:t>11/11/2018</a:t>
             </a:fld>
             <a:endParaRPr lang="en-US"/>
           </a:p>
@@ -2856,7 +2856,7 @@
           <a:p>
             <a:fld id="{78C97017-6FC3-485B-9764-EAC9E56C1D49}" type="datetimeFigureOut">
               <a:rPr lang="en-US" smtClean="0"/>
-              <a:t>6/27/2018</a:t>
+              <a:t>11/11/2018</a:t>
             </a:fld>
             <a:endParaRPr lang="en-US"/>
           </a:p>
@@ -3067,7 +3067,7 @@
           <a:p>
             <a:fld id="{78C97017-6FC3-485B-9764-EAC9E56C1D49}" type="datetimeFigureOut">
               <a:rPr lang="en-US" smtClean="0"/>
-              <a:t>6/27/2018</a:t>
+              <a:t>11/11/2018</a:t>
             </a:fld>
             <a:endParaRPr lang="en-US"/>
           </a:p>
@@ -3450,8 +3450,8 @@
         </p:nvSpPr>
         <p:spPr>
           <a:xfrm>
-            <a:off x="1119865" y="1676400"/>
-            <a:ext cx="7490735" cy="3059747"/>
+            <a:off x="235174" y="76200"/>
+            <a:ext cx="8786135" cy="5248200"/>
           </a:xfrm>
           <a:prstGeom prst="roundRect">
             <a:avLst>
@@ -3511,7 +3511,7 @@
         </p:nvSpPr>
         <p:spPr>
           <a:xfrm>
-            <a:off x="2877180" y="3463240"/>
+            <a:off x="2015434" y="2058223"/>
             <a:ext cx="1093635" cy="346760"/>
           </a:xfrm>
           <a:prstGeom prst="rect">
@@ -3570,8 +3570,8 @@
         </p:nvSpPr>
         <p:spPr>
           <a:xfrm rot="16200000">
-            <a:off x="1661548" y="3097750"/>
-            <a:ext cx="1093635" cy="346760"/>
+            <a:off x="377609" y="1896797"/>
+            <a:ext cx="1892131" cy="346760"/>
           </a:xfrm>
           <a:prstGeom prst="rect">
             <a:avLst/>
@@ -3626,18 +3626,17 @@
           <p:cNvPr id="107" name="Elbow Connector 106"/>
           <p:cNvCxnSpPr>
             <a:cxnSpLocks/>
+            <a:endCxn id="62" idx="2"/>
           </p:cNvCxnSpPr>
           <p:nvPr/>
         </p:nvCxnSpPr>
         <p:spPr>
-          <a:xfrm rot="5400000" flipH="1" flipV="1">
-            <a:off x="4155901" y="1308943"/>
-            <a:ext cx="613122" cy="4459404"/>
-          </a:xfrm>
-          <a:prstGeom prst="bentConnector3">
-            <a:avLst>
-              <a:gd name="adj1" fmla="val -26668"/>
-            </a:avLst>
+          <a:xfrm flipV="1">
+            <a:off x="1519600" y="1604626"/>
+            <a:ext cx="4263479" cy="233017"/>
+          </a:xfrm>
+          <a:prstGeom prst="bentConnector2">
+            <a:avLst/>
           </a:prstGeom>
           <a:ln w="19050">
             <a:solidFill>
@@ -3672,7 +3671,7 @@
         </p:nvSpPr>
         <p:spPr>
           <a:xfrm rot="16200000">
-            <a:off x="956202" y="2861202"/>
+            <a:off x="71511" y="1261002"/>
             <a:ext cx="1093635" cy="346760"/>
           </a:xfrm>
           <a:prstGeom prst="rect">
@@ -3742,7 +3741,7 @@
         </p:nvSpPr>
         <p:spPr>
           <a:xfrm rot="16200000">
-            <a:off x="1626910" y="2952291"/>
+            <a:off x="742219" y="1352091"/>
             <a:ext cx="270504" cy="175523"/>
           </a:xfrm>
           <a:prstGeom prst="triangle">
@@ -3792,7 +3791,7 @@
         </p:nvCxnSpPr>
         <p:spPr>
           <a:xfrm>
-            <a:off x="2609828" y="3636620"/>
+            <a:off x="1748082" y="2231603"/>
             <a:ext cx="267352" cy="0"/>
           </a:xfrm>
           <a:prstGeom prst="straightConnector1">
@@ -3830,7 +3829,7 @@
         </p:nvCxnSpPr>
         <p:spPr>
           <a:xfrm>
-            <a:off x="910091" y="3040053"/>
+            <a:off x="25400" y="1439853"/>
             <a:ext cx="419548" cy="2860"/>
           </a:xfrm>
           <a:prstGeom prst="bentConnector3">
@@ -3875,7 +3874,7 @@
         </p:nvCxnSpPr>
         <p:spPr>
           <a:xfrm flipV="1">
-            <a:off x="1849924" y="3040052"/>
+            <a:off x="965233" y="1439852"/>
             <a:ext cx="216105" cy="1"/>
           </a:xfrm>
           <a:prstGeom prst="line">
@@ -3914,7 +3913,7 @@
         </p:nvSpPr>
         <p:spPr>
           <a:xfrm>
-            <a:off x="2373780" y="3549930"/>
+            <a:off x="1512034" y="2144913"/>
             <a:ext cx="236048" cy="173380"/>
           </a:xfrm>
           <a:prstGeom prst="flowChartDecision">
@@ -3959,7 +3958,7 @@
         </p:nvSpPr>
         <p:spPr>
           <a:xfrm>
-            <a:off x="2786406" y="2834911"/>
+            <a:off x="1901715" y="1234711"/>
             <a:ext cx="1447688" cy="346760"/>
           </a:xfrm>
           <a:prstGeom prst="rect">
@@ -3992,7 +3991,7 @@
           <a:p>
             <a:pPr algn="ctr"/>
             <a:r>
-              <a:rPr lang="en-US" sz="1050" dirty="0" err="1" smtClean="0">
+              <a:rPr lang="en-US" sz="1050" dirty="0" err="1">
                 <a:solidFill>
                   <a:srgbClr val="7030A0"/>
                 </a:solidFill>
@@ -4018,7 +4017,7 @@
         </p:nvCxnSpPr>
         <p:spPr>
           <a:xfrm>
-            <a:off x="2624360" y="3003033"/>
+            <a:off x="1739669" y="1402833"/>
             <a:ext cx="162046" cy="5258"/>
           </a:xfrm>
           <a:prstGeom prst="straightConnector1">
@@ -4056,7 +4055,7 @@
         </p:nvSpPr>
         <p:spPr>
           <a:xfrm>
-            <a:off x="2388312" y="2916343"/>
+            <a:off x="1503621" y="1316143"/>
             <a:ext cx="236048" cy="173380"/>
           </a:xfrm>
           <a:prstGeom prst="flowChartDecision">
@@ -4101,7 +4100,7 @@
         </p:nvSpPr>
         <p:spPr>
           <a:xfrm>
-            <a:off x="4762209" y="2863434"/>
+            <a:off x="3877518" y="1263234"/>
             <a:ext cx="1156969" cy="346760"/>
           </a:xfrm>
           <a:prstGeom prst="rect">
@@ -4157,7 +4156,7 @@
         </p:nvSpPr>
         <p:spPr>
           <a:xfrm>
-            <a:off x="4233246" y="2948201"/>
+            <a:off x="3348555" y="1348001"/>
             <a:ext cx="236048" cy="173380"/>
           </a:xfrm>
           <a:prstGeom prst="flowChartDecision">
@@ -4207,7 +4206,7 @@
         </p:nvCxnSpPr>
         <p:spPr>
           <a:xfrm>
-            <a:off x="4469294" y="3034891"/>
+            <a:off x="3584603" y="1434691"/>
             <a:ext cx="292915" cy="1923"/>
           </a:xfrm>
           <a:prstGeom prst="bentConnector3">
@@ -4245,7 +4244,7 @@
         </p:nvSpPr>
         <p:spPr>
           <a:xfrm>
-            <a:off x="6313677" y="2858066"/>
+            <a:off x="5428986" y="1257866"/>
             <a:ext cx="708186" cy="346760"/>
           </a:xfrm>
           <a:prstGeom prst="rect">
@@ -4301,7 +4300,7 @@
         </p:nvSpPr>
         <p:spPr>
           <a:xfrm>
-            <a:off x="5918460" y="2941065"/>
+            <a:off x="5033769" y="1340865"/>
             <a:ext cx="236048" cy="173380"/>
           </a:xfrm>
           <a:prstGeom prst="flowChartDecision">
@@ -4350,7 +4349,7 @@
         </p:nvCxnSpPr>
         <p:spPr>
           <a:xfrm>
-            <a:off x="6154508" y="3027755"/>
+            <a:off x="5269817" y="1427555"/>
             <a:ext cx="159169" cy="3691"/>
           </a:xfrm>
           <a:prstGeom prst="bentConnector3">
@@ -4382,69 +4381,13 @@
       </p:cxnSp>
       <p:sp>
         <p:nvSpPr>
-          <p:cNvPr id="76" name="Rectangle 8"/>
-          <p:cNvSpPr/>
-          <p:nvPr/>
-        </p:nvSpPr>
-        <p:spPr>
-          <a:xfrm>
-            <a:off x="7712397" y="2564238"/>
-            <a:ext cx="708186" cy="285783"/>
-          </a:xfrm>
-          <a:prstGeom prst="rect">
-            <a:avLst/>
-          </a:prstGeom>
-          <a:ln w="19050">
-            <a:solidFill>
-              <a:srgbClr val="7030A0"/>
-            </a:solidFill>
-          </a:ln>
-          <a:effectLst/>
-        </p:spPr>
-        <p:style>
-          <a:lnRef idx="1">
-            <a:schemeClr val="accent4"/>
-          </a:lnRef>
-          <a:fillRef idx="2">
-            <a:schemeClr val="accent4"/>
-          </a:fillRef>
-          <a:effectRef idx="1">
-            <a:schemeClr val="accent4"/>
-          </a:effectRef>
-          <a:fontRef idx="minor">
-            <a:schemeClr val="dk1"/>
-          </a:fontRef>
-        </p:style>
-        <p:txBody>
-          <a:bodyPr rtlCol="0" anchor="ctr"/>
-          <a:lstStyle/>
-          <a:p>
-            <a:pPr algn="ctr"/>
-            <a:r>
-              <a:rPr lang="en-US" sz="1050" dirty="0">
-                <a:solidFill>
-                  <a:srgbClr val="7030A0"/>
-                </a:solidFill>
-              </a:rPr>
-              <a:t>Name</a:t>
-            </a:r>
-            <a:endParaRPr lang="en-SG" sz="1050" dirty="0">
-              <a:solidFill>
-                <a:srgbClr val="7030A0"/>
-              </a:solidFill>
-            </a:endParaRPr>
-          </a:p>
-        </p:txBody>
-      </p:sp>
-      <p:sp>
-        <p:nvSpPr>
           <p:cNvPr id="78" name="Flowchart: Decision 96"/>
           <p:cNvSpPr/>
           <p:nvPr/>
         </p:nvSpPr>
         <p:spPr>
           <a:xfrm>
-            <a:off x="7041947" y="2948201"/>
+            <a:off x="6137172" y="1341030"/>
             <a:ext cx="236048" cy="173380"/>
           </a:xfrm>
           <a:prstGeom prst="flowChartDecision">
@@ -4483,56 +4426,55 @@
           </a:p>
         </p:txBody>
       </p:sp>
-      <p:cxnSp>
-        <p:nvCxnSpPr>
-          <p:cNvPr id="79" name="Elbow Connector 78"/>
-          <p:cNvCxnSpPr>
-            <a:cxnSpLocks/>
-          </p:cNvCxnSpPr>
-          <p:nvPr/>
-        </p:nvCxnSpPr>
-        <p:spPr>
-          <a:xfrm flipV="1">
-            <a:off x="7277995" y="2706821"/>
-            <a:ext cx="434402" cy="327761"/>
-          </a:xfrm>
-          <a:prstGeom prst="bentConnector3">
-            <a:avLst/>
-          </a:prstGeom>
-          <a:ln w="19050">
-            <a:solidFill>
-              <a:srgbClr val="7030A0"/>
-            </a:solidFill>
-            <a:headEnd type="none" w="med" len="med"/>
-            <a:tailEnd type="arrow" w="med" len="med"/>
-          </a:ln>
-          <a:effectLst/>
-        </p:spPr>
-        <p:style>
-          <a:lnRef idx="1">
-            <a:schemeClr val="accent2"/>
-          </a:lnRef>
-          <a:fillRef idx="2">
-            <a:schemeClr val="accent2"/>
-          </a:fillRef>
-          <a:effectRef idx="1">
-            <a:schemeClr val="accent2"/>
-          </a:effectRef>
-          <a:fontRef idx="minor">
-            <a:schemeClr val="dk1"/>
-          </a:fontRef>
-        </p:style>
-      </p:cxnSp>
-      <p:sp>
-        <p:nvSpPr>
-          <p:cNvPr id="80" name="Rectangle 8"/>
+      <p:sp>
+        <p:nvSpPr>
+          <p:cNvPr id="114" name="TextBox 113"/>
+          <p:cNvSpPr txBox="1"/>
+          <p:nvPr/>
+        </p:nvSpPr>
+        <p:spPr>
+          <a:xfrm>
+            <a:off x="5079672" y="1815213"/>
+            <a:ext cx="881018" cy="261610"/>
+          </a:xfrm>
+          <a:prstGeom prst="rect">
+            <a:avLst/>
+          </a:prstGeom>
+          <a:noFill/>
+        </p:spPr>
+        <p:txBody>
+          <a:bodyPr wrap="square" rtlCol="0">
+            <a:spAutoFit/>
+          </a:bodyPr>
+          <a:lstStyle/>
+          <a:p>
+            <a:pPr algn="r"/>
+            <a:r>
+              <a:rPr lang="en-US" sz="1100" dirty="0">
+                <a:solidFill>
+                  <a:srgbClr val="7030A0"/>
+                </a:solidFill>
+              </a:rPr>
+              <a:t>filtered list</a:t>
+            </a:r>
+            <a:endParaRPr lang="en-SG" sz="1100" dirty="0">
+              <a:solidFill>
+                <a:srgbClr val="7030A0"/>
+              </a:solidFill>
+            </a:endParaRPr>
+          </a:p>
+        </p:txBody>
+      </p:sp>
+      <p:sp>
+        <p:nvSpPr>
+          <p:cNvPr id="122" name="Rectangle 8"/>
           <p:cNvSpPr/>
           <p:nvPr/>
         </p:nvSpPr>
         <p:spPr>
           <a:xfrm>
-            <a:off x="7712397" y="2887216"/>
-            <a:ext cx="708186" cy="285783"/>
+            <a:off x="1181338" y="4084046"/>
+            <a:ext cx="1066800" cy="346760"/>
           </a:xfrm>
           <a:prstGeom prst="rect">
             <a:avLst/>
@@ -4569,345 +4511,7 @@
                   <a:srgbClr val="7030A0"/>
                 </a:solidFill>
               </a:rPr>
-              <a:t>Phone</a:t>
-            </a:r>
-            <a:endParaRPr lang="en-SG" sz="1050" dirty="0">
-              <a:solidFill>
-                <a:srgbClr val="7030A0"/>
-              </a:solidFill>
-            </a:endParaRPr>
-          </a:p>
-        </p:txBody>
-      </p:sp>
-      <p:cxnSp>
-        <p:nvCxnSpPr>
-          <p:cNvPr id="81" name="Elbow Connector 80"/>
-          <p:cNvCxnSpPr>
-            <a:stCxn id="78" idx="3"/>
-            <a:endCxn id="80" idx="1"/>
-          </p:cNvCxnSpPr>
-          <p:nvPr/>
-        </p:nvCxnSpPr>
-        <p:spPr>
-          <a:xfrm flipV="1">
-            <a:off x="7277995" y="3030108"/>
-            <a:ext cx="434402" cy="4783"/>
-          </a:xfrm>
-          <a:prstGeom prst="bentConnector3">
-            <a:avLst/>
-          </a:prstGeom>
-          <a:ln w="19050">
-            <a:solidFill>
-              <a:srgbClr val="7030A0"/>
-            </a:solidFill>
-            <a:headEnd type="none" w="med" len="med"/>
-            <a:tailEnd type="arrow" w="med" len="med"/>
-          </a:ln>
-          <a:effectLst/>
-        </p:spPr>
-        <p:style>
-          <a:lnRef idx="1">
-            <a:schemeClr val="accent2"/>
-          </a:lnRef>
-          <a:fillRef idx="2">
-            <a:schemeClr val="accent2"/>
-          </a:fillRef>
-          <a:effectRef idx="1">
-            <a:schemeClr val="accent2"/>
-          </a:effectRef>
-          <a:fontRef idx="minor">
-            <a:schemeClr val="dk1"/>
-          </a:fontRef>
-        </p:style>
-      </p:cxnSp>
-      <p:sp>
-        <p:nvSpPr>
-          <p:cNvPr id="83" name="Rectangle 8"/>
-          <p:cNvSpPr/>
-          <p:nvPr/>
-        </p:nvSpPr>
-        <p:spPr>
-          <a:xfrm>
-            <a:off x="7712397" y="3210194"/>
-            <a:ext cx="708186" cy="285783"/>
-          </a:xfrm>
-          <a:prstGeom prst="rect">
-            <a:avLst/>
-          </a:prstGeom>
-          <a:ln w="19050">
-            <a:solidFill>
-              <a:srgbClr val="7030A0"/>
-            </a:solidFill>
-          </a:ln>
-          <a:effectLst/>
-        </p:spPr>
-        <p:style>
-          <a:lnRef idx="1">
-            <a:schemeClr val="accent4"/>
-          </a:lnRef>
-          <a:fillRef idx="2">
-            <a:schemeClr val="accent4"/>
-          </a:fillRef>
-          <a:effectRef idx="1">
-            <a:schemeClr val="accent4"/>
-          </a:effectRef>
-          <a:fontRef idx="minor">
-            <a:schemeClr val="dk1"/>
-          </a:fontRef>
-        </p:style>
-        <p:txBody>
-          <a:bodyPr rtlCol="0" anchor="ctr"/>
-          <a:lstStyle/>
-          <a:p>
-            <a:pPr algn="ctr"/>
-            <a:r>
-              <a:rPr lang="en-US" sz="1050" dirty="0">
-                <a:solidFill>
-                  <a:srgbClr val="7030A0"/>
-                </a:solidFill>
-              </a:rPr>
-              <a:t>Email</a:t>
-            </a:r>
-            <a:endParaRPr lang="en-SG" sz="1050" dirty="0">
-              <a:solidFill>
-                <a:srgbClr val="7030A0"/>
-              </a:solidFill>
-            </a:endParaRPr>
-          </a:p>
-        </p:txBody>
-      </p:sp>
-      <p:cxnSp>
-        <p:nvCxnSpPr>
-          <p:cNvPr id="84" name="Elbow Connector 83"/>
-          <p:cNvCxnSpPr>
-            <a:stCxn id="78" idx="3"/>
-            <a:endCxn id="83" idx="1"/>
-          </p:cNvCxnSpPr>
-          <p:nvPr/>
-        </p:nvCxnSpPr>
-        <p:spPr>
-          <a:xfrm>
-            <a:off x="7277995" y="3034891"/>
-            <a:ext cx="434402" cy="318195"/>
-          </a:xfrm>
-          <a:prstGeom prst="bentConnector3">
-            <a:avLst/>
-          </a:prstGeom>
-          <a:ln w="19050">
-            <a:solidFill>
-              <a:srgbClr val="7030A0"/>
-            </a:solidFill>
-            <a:headEnd type="none" w="med" len="med"/>
-            <a:tailEnd type="arrow" w="med" len="med"/>
-          </a:ln>
-          <a:effectLst/>
-        </p:spPr>
-        <p:style>
-          <a:lnRef idx="1">
-            <a:schemeClr val="accent2"/>
-          </a:lnRef>
-          <a:fillRef idx="2">
-            <a:schemeClr val="accent2"/>
-          </a:fillRef>
-          <a:effectRef idx="1">
-            <a:schemeClr val="accent2"/>
-          </a:effectRef>
-          <a:fontRef idx="minor">
-            <a:schemeClr val="dk1"/>
-          </a:fontRef>
-        </p:style>
-      </p:cxnSp>
-      <p:sp>
-        <p:nvSpPr>
-          <p:cNvPr id="85" name="Rectangle 8"/>
-          <p:cNvSpPr/>
-          <p:nvPr/>
-        </p:nvSpPr>
-        <p:spPr>
-          <a:xfrm>
-            <a:off x="7712397" y="3533171"/>
-            <a:ext cx="708186" cy="285783"/>
-          </a:xfrm>
-          <a:prstGeom prst="rect">
-            <a:avLst/>
-          </a:prstGeom>
-          <a:ln w="19050">
-            <a:solidFill>
-              <a:srgbClr val="7030A0"/>
-            </a:solidFill>
-          </a:ln>
-          <a:effectLst/>
-        </p:spPr>
-        <p:style>
-          <a:lnRef idx="1">
-            <a:schemeClr val="accent4"/>
-          </a:lnRef>
-          <a:fillRef idx="2">
-            <a:schemeClr val="accent4"/>
-          </a:fillRef>
-          <a:effectRef idx="1">
-            <a:schemeClr val="accent4"/>
-          </a:effectRef>
-          <a:fontRef idx="minor">
-            <a:schemeClr val="dk1"/>
-          </a:fontRef>
-        </p:style>
-        <p:txBody>
-          <a:bodyPr rtlCol="0" anchor="ctr"/>
-          <a:lstStyle/>
-          <a:p>
-            <a:pPr algn="ctr"/>
-            <a:r>
-              <a:rPr lang="en-US" sz="1050" dirty="0">
-                <a:solidFill>
-                  <a:srgbClr val="7030A0"/>
-                </a:solidFill>
-              </a:rPr>
-              <a:t>Address</a:t>
-            </a:r>
-            <a:endParaRPr lang="en-SG" sz="1050" dirty="0">
-              <a:solidFill>
-                <a:srgbClr val="7030A0"/>
-              </a:solidFill>
-            </a:endParaRPr>
-          </a:p>
-        </p:txBody>
-      </p:sp>
-      <p:cxnSp>
-        <p:nvCxnSpPr>
-          <p:cNvPr id="86" name="Elbow Connector 85"/>
-          <p:cNvCxnSpPr>
-            <a:stCxn id="78" idx="3"/>
-            <a:endCxn id="85" idx="1"/>
-          </p:cNvCxnSpPr>
-          <p:nvPr/>
-        </p:nvCxnSpPr>
-        <p:spPr>
-          <a:xfrm>
-            <a:off x="7277995" y="3034891"/>
-            <a:ext cx="434402" cy="641172"/>
-          </a:xfrm>
-          <a:prstGeom prst="bentConnector3">
-            <a:avLst/>
-          </a:prstGeom>
-          <a:ln w="19050">
-            <a:solidFill>
-              <a:srgbClr val="7030A0"/>
-            </a:solidFill>
-            <a:headEnd type="none" w="med" len="med"/>
-            <a:tailEnd type="arrow" w="med" len="med"/>
-          </a:ln>
-          <a:effectLst/>
-        </p:spPr>
-        <p:style>
-          <a:lnRef idx="1">
-            <a:schemeClr val="accent2"/>
-          </a:lnRef>
-          <a:fillRef idx="2">
-            <a:schemeClr val="accent2"/>
-          </a:fillRef>
-          <a:effectRef idx="1">
-            <a:schemeClr val="accent2"/>
-          </a:effectRef>
-          <a:fontRef idx="minor">
-            <a:schemeClr val="dk1"/>
-          </a:fontRef>
-        </p:style>
-      </p:cxnSp>
-      <p:sp>
-        <p:nvSpPr>
-          <p:cNvPr id="114" name="TextBox 113"/>
-          <p:cNvSpPr txBox="1"/>
-          <p:nvPr/>
-        </p:nvSpPr>
-        <p:spPr>
-          <a:xfrm rot="16200000">
-            <a:off x="6362886" y="3586305"/>
-            <a:ext cx="881018" cy="261610"/>
-          </a:xfrm>
-          <a:prstGeom prst="rect">
-            <a:avLst/>
-          </a:prstGeom>
-          <a:noFill/>
-        </p:spPr>
-        <p:txBody>
-          <a:bodyPr wrap="square" rtlCol="0">
-            <a:spAutoFit/>
-          </a:bodyPr>
-          <a:lstStyle/>
-          <a:p>
-            <a:pPr algn="r"/>
-            <a:r>
-              <a:rPr lang="en-US" sz="1100" dirty="0">
-                <a:solidFill>
-                  <a:srgbClr val="7030A0"/>
-                </a:solidFill>
-              </a:rPr>
-              <a:t>filtered list</a:t>
-            </a:r>
-            <a:endParaRPr lang="en-SG" sz="1100" dirty="0">
-              <a:solidFill>
-                <a:srgbClr val="7030A0"/>
-              </a:solidFill>
-            </a:endParaRPr>
-          </a:p>
-        </p:txBody>
-      </p:sp>
-      <p:sp>
-        <p:nvSpPr>
-          <p:cNvPr id="122" name="Rectangle 8"/>
-          <p:cNvSpPr/>
-          <p:nvPr/>
-        </p:nvSpPr>
-        <p:spPr>
-          <a:xfrm>
-            <a:off x="2057401" y="4239491"/>
-            <a:ext cx="1066800" cy="346760"/>
-          </a:xfrm>
-          <a:prstGeom prst="rect">
-            <a:avLst/>
-          </a:prstGeom>
-          <a:ln w="19050">
-            <a:solidFill>
-              <a:srgbClr val="7030A0"/>
-            </a:solidFill>
-          </a:ln>
-          <a:effectLst/>
-        </p:spPr>
-        <p:style>
-          <a:lnRef idx="1">
-            <a:schemeClr val="accent4"/>
-          </a:lnRef>
-          <a:fillRef idx="2">
-            <a:schemeClr val="accent4"/>
-          </a:fillRef>
-          <a:effectRef idx="1">
-            <a:schemeClr val="accent4"/>
-          </a:effectRef>
-          <a:fontRef idx="minor">
-            <a:schemeClr val="dk1"/>
-          </a:fontRef>
-        </p:style>
-        <p:txBody>
-          <a:bodyPr rtlCol="0" anchor="ctr"/>
-          <a:lstStyle/>
-          <a:p>
-            <a:pPr algn="ctr"/>
-            <a:r>
-              <a:rPr lang="en-US" sz="1050" dirty="0">
-                <a:solidFill>
-                  <a:srgbClr val="7030A0"/>
-                </a:solidFill>
-              </a:rPr>
               <a:t>&lt;&lt;interface&gt;&gt;</a:t>
-            </a:r>
-            <a:r>
-              <a:rPr lang="en-US" sz="1050">
-                <a:solidFill>
-                  <a:srgbClr val="7030A0"/>
-                </a:solidFill>
-              </a:rPr>
-              <a:t/>
             </a:r>
             <a:br>
               <a:rPr lang="en-US" sz="1050">
@@ -4943,8 +4547,8 @@
         </p:nvCxnSpPr>
         <p:spPr>
           <a:xfrm rot="16200000" flipH="1">
-            <a:off x="1364475" y="3719944"/>
-            <a:ext cx="831471" cy="554381"/>
+            <a:off x="-238280" y="2837808"/>
+            <a:ext cx="2276226" cy="563009"/>
           </a:xfrm>
           <a:prstGeom prst="bentConnector2">
             <a:avLst/>
@@ -4982,7 +4586,7 @@
         </p:nvSpPr>
         <p:spPr>
           <a:xfrm>
-            <a:off x="4324972" y="3058864"/>
+            <a:off x="3440281" y="1458664"/>
             <a:ext cx="189257" cy="178683"/>
           </a:xfrm>
           <a:prstGeom prst="rect">
@@ -5021,7 +4625,7 @@
         </p:nvSpPr>
         <p:spPr>
           <a:xfrm>
-            <a:off x="6135256" y="3097917"/>
+            <a:off x="5250565" y="1497717"/>
             <a:ext cx="189257" cy="178683"/>
           </a:xfrm>
           <a:prstGeom prst="rect">
@@ -5060,7 +4664,7 @@
         </p:nvSpPr>
         <p:spPr>
           <a:xfrm>
-            <a:off x="2560167" y="2753818"/>
+            <a:off x="1675476" y="1153618"/>
             <a:ext cx="78378" cy="193767"/>
           </a:xfrm>
           <a:prstGeom prst="rect">
@@ -5099,7 +4703,7 @@
         </p:nvSpPr>
         <p:spPr>
           <a:xfrm>
-            <a:off x="2707070" y="3667737"/>
+            <a:off x="1845324" y="2262720"/>
             <a:ext cx="189257" cy="178683"/>
           </a:xfrm>
           <a:prstGeom prst="rect">
@@ -5138,7 +4742,7 @@
         </p:nvSpPr>
         <p:spPr>
           <a:xfrm>
-            <a:off x="6449896" y="3204826"/>
+            <a:off x="5565205" y="1604626"/>
             <a:ext cx="189257" cy="178683"/>
           </a:xfrm>
           <a:prstGeom prst="rect">
@@ -5183,7 +4787,7 @@
         </p:nvSpPr>
         <p:spPr>
           <a:xfrm>
-            <a:off x="4755872" y="2206861"/>
+            <a:off x="3871181" y="606661"/>
             <a:ext cx="1156969" cy="285783"/>
           </a:xfrm>
           <a:prstGeom prst="rect">
@@ -5242,15 +4846,15 @@
           </p:cNvPr>
           <p:cNvCxnSpPr>
             <a:cxnSpLocks/>
-            <a:stCxn id="54" idx="0"/>
+            <a:stCxn id="51" idx="0"/>
             <a:endCxn id="52" idx="1"/>
           </p:cNvCxnSpPr>
           <p:nvPr/>
         </p:nvCxnSpPr>
         <p:spPr>
           <a:xfrm rot="5400000" flipH="1" flipV="1">
-            <a:off x="4233181" y="2536174"/>
-            <a:ext cx="709111" cy="336271"/>
+            <a:off x="3369656" y="846476"/>
+            <a:ext cx="598448" cy="404602"/>
           </a:xfrm>
           <a:prstGeom prst="bentConnector2">
             <a:avLst/>
@@ -5293,7 +4897,7 @@
         </p:nvSpPr>
         <p:spPr>
           <a:xfrm>
-            <a:off x="6714344" y="2430721"/>
+            <a:off x="5799893" y="759469"/>
             <a:ext cx="189257" cy="178683"/>
           </a:xfrm>
           <a:prstGeom prst="rect">
@@ -5338,7 +4942,7 @@
         </p:nvSpPr>
         <p:spPr>
           <a:xfrm rot="16200000">
-            <a:off x="6553482" y="2664721"/>
+            <a:off x="5668791" y="1064521"/>
             <a:ext cx="236048" cy="173380"/>
           </a:xfrm>
           <a:prstGeom prst="flowChartDecision">
@@ -5386,16 +4990,17 @@
           </p:cNvPr>
           <p:cNvCxnSpPr>
             <a:cxnSpLocks/>
+            <a:stCxn id="71" idx="0"/>
             <a:endCxn id="67" idx="1"/>
           </p:cNvCxnSpPr>
           <p:nvPr/>
         </p:nvCxnSpPr>
         <p:spPr>
-          <a:xfrm flipV="1">
-            <a:off x="5884280" y="2233006"/>
-            <a:ext cx="432916" cy="111294"/>
-          </a:xfrm>
-          <a:prstGeom prst="bentConnector3">
+          <a:xfrm rot="5400000" flipH="1" flipV="1">
+            <a:off x="5244519" y="470280"/>
+            <a:ext cx="91744" cy="291459"/>
+          </a:xfrm>
+          <a:prstGeom prst="bentConnector2">
             <a:avLst/>
           </a:prstGeom>
           <a:ln w="19050">
@@ -5436,7 +5041,7 @@
         </p:nvSpPr>
         <p:spPr>
           <a:xfrm>
-            <a:off x="6317196" y="2059626"/>
+            <a:off x="5436121" y="396757"/>
             <a:ext cx="708186" cy="346760"/>
           </a:xfrm>
           <a:prstGeom prst="rect">
@@ -5498,7 +5103,7 @@
         </p:nvSpPr>
         <p:spPr>
           <a:xfrm>
-            <a:off x="6135256" y="2278014"/>
+            <a:off x="5262686" y="615686"/>
             <a:ext cx="189257" cy="178683"/>
           </a:xfrm>
           <a:prstGeom prst="rect">
@@ -5543,7 +5148,7 @@
         </p:nvSpPr>
         <p:spPr>
           <a:xfrm>
-            <a:off x="4367100" y="2172972"/>
+            <a:off x="3482409" y="572772"/>
             <a:ext cx="189257" cy="178683"/>
           </a:xfrm>
           <a:prstGeom prst="rect">
@@ -5588,7 +5193,7 @@
         </p:nvSpPr>
         <p:spPr>
           <a:xfrm>
-            <a:off x="5911329" y="2262081"/>
+            <a:off x="5026638" y="661881"/>
             <a:ext cx="236048" cy="173380"/>
           </a:xfrm>
           <a:prstGeom prst="flowChartDecision">
@@ -5644,9 +5249,9 @@
           <p:nvPr/>
         </p:nvCxnSpPr>
         <p:spPr>
-          <a:xfrm rot="16200000" flipV="1">
-            <a:off x="6557898" y="2519778"/>
-            <a:ext cx="227001" cy="217"/>
+          <a:xfrm rot="5400000" flipH="1" flipV="1">
+            <a:off x="5643679" y="886653"/>
+            <a:ext cx="289670" cy="3399"/>
           </a:xfrm>
           <a:prstGeom prst="bentConnector3">
             <a:avLst>
@@ -5687,7 +5292,7 @@
         </p:nvCxnSpPr>
         <p:spPr>
           <a:xfrm rot="5400000">
-            <a:off x="3470636" y="2687353"/>
+            <a:off x="2585945" y="1087153"/>
             <a:ext cx="293825" cy="5938"/>
           </a:xfrm>
           <a:prstGeom prst="bentConnector3">
@@ -5728,7 +5333,7 @@
         </p:nvSpPr>
         <p:spPr>
           <a:xfrm rot="10800000" flipV="1">
-            <a:off x="3479324" y="2386348"/>
+            <a:off x="2594633" y="786148"/>
             <a:ext cx="282387" cy="157062"/>
           </a:xfrm>
           <a:prstGeom prst="triangle">
@@ -5776,7 +5381,7 @@
         </p:nvSpPr>
         <p:spPr>
           <a:xfrm>
-            <a:off x="1177947" y="1998144"/>
+            <a:off x="293256" y="397944"/>
             <a:ext cx="1443661" cy="364396"/>
           </a:xfrm>
           <a:prstGeom prst="rect">
@@ -5847,7 +5452,7 @@
         </p:nvSpPr>
         <p:spPr>
           <a:xfrm>
-            <a:off x="3087206" y="1998144"/>
+            <a:off x="2202515" y="397944"/>
             <a:ext cx="1060683" cy="364396"/>
           </a:xfrm>
           <a:prstGeom prst="rect">
@@ -5903,7 +5508,7 @@
         </p:nvSpPr>
         <p:spPr>
           <a:xfrm rot="16200000">
-            <a:off x="2586098" y="2068952"/>
+            <a:off x="1701407" y="468752"/>
             <a:ext cx="271014" cy="187417"/>
           </a:xfrm>
           <a:prstGeom prst="triangle">
@@ -5958,7 +5563,7 @@
         </p:nvCxnSpPr>
         <p:spPr>
           <a:xfrm>
-            <a:off x="2815314" y="2177521"/>
+            <a:off x="1930623" y="577321"/>
             <a:ext cx="271892" cy="2821"/>
           </a:xfrm>
           <a:prstGeom prst="bentConnector3">
@@ -5988,6 +5593,3145 @@
           </a:effectRef>
           <a:fontRef idx="minor">
             <a:schemeClr val="dk1"/>
+          </a:fontRef>
+        </p:style>
+      </p:cxnSp>
+      <p:sp>
+        <p:nvSpPr>
+          <p:cNvPr id="60" name="Rectangle 8">
+            <a:extLst>
+              <a:ext uri="{FF2B5EF4-FFF2-40B4-BE49-F238E27FC236}">
+                <a16:creationId xmlns:a16="http://schemas.microsoft.com/office/drawing/2014/main" id="{C7CC79C4-650E-4BE7-BA17-CAFAA9EBB68B}"/>
+              </a:ext>
+            </a:extLst>
+          </p:cNvPr>
+          <p:cNvSpPr/>
+          <p:nvPr/>
+        </p:nvSpPr>
+        <p:spPr>
+          <a:xfrm>
+            <a:off x="1938250" y="2724568"/>
+            <a:ext cx="754302" cy="334856"/>
+          </a:xfrm>
+          <a:prstGeom prst="rect">
+            <a:avLst/>
+          </a:prstGeom>
+          <a:ln w="19050">
+            <a:solidFill>
+              <a:srgbClr val="7030A0"/>
+            </a:solidFill>
+          </a:ln>
+          <a:effectLst/>
+        </p:spPr>
+        <p:style>
+          <a:lnRef idx="1">
+            <a:schemeClr val="accent4"/>
+          </a:lnRef>
+          <a:fillRef idx="2">
+            <a:schemeClr val="accent4"/>
+          </a:fillRef>
+          <a:effectRef idx="1">
+            <a:schemeClr val="accent4"/>
+          </a:effectRef>
+          <a:fontRef idx="minor">
+            <a:schemeClr val="dk1"/>
+          </a:fontRef>
+        </p:style>
+        <p:txBody>
+          <a:bodyPr rtlCol="0" anchor="ctr"/>
+          <a:lstStyle/>
+          <a:p>
+            <a:pPr algn="ctr"/>
+            <a:r>
+              <a:rPr lang="en-US" sz="1050" dirty="0" err="1">
+                <a:solidFill>
+                  <a:srgbClr val="7030A0"/>
+                </a:solidFill>
+              </a:rPr>
+              <a:t>VersionedLeaveList</a:t>
+            </a:r>
+            <a:endParaRPr lang="en-SG" sz="1050" dirty="0">
+              <a:solidFill>
+                <a:srgbClr val="7030A0"/>
+              </a:solidFill>
+            </a:endParaRPr>
+          </a:p>
+        </p:txBody>
+      </p:sp>
+      <p:cxnSp>
+        <p:nvCxnSpPr>
+          <p:cNvPr id="73" name="Straight Arrow Connector 72">
+            <a:extLst>
+              <a:ext uri="{FF2B5EF4-FFF2-40B4-BE49-F238E27FC236}">
+                <a16:creationId xmlns:a16="http://schemas.microsoft.com/office/drawing/2014/main" id="{DAFE77B0-54C9-4EAB-80A7-443050CB5EFC}"/>
+              </a:ext>
+            </a:extLst>
+          </p:cNvPr>
+          <p:cNvCxnSpPr>
+            <a:cxnSpLocks/>
+            <a:stCxn id="74" idx="3"/>
+            <a:endCxn id="60" idx="1"/>
+          </p:cNvCxnSpPr>
+          <p:nvPr/>
+        </p:nvCxnSpPr>
+        <p:spPr>
+          <a:xfrm>
+            <a:off x="1737330" y="2881439"/>
+            <a:ext cx="200920" cy="10557"/>
+          </a:xfrm>
+          <a:prstGeom prst="straightConnector1">
+            <a:avLst/>
+          </a:prstGeom>
+          <a:ln w="19050">
+            <a:solidFill>
+              <a:srgbClr val="7030A0"/>
+            </a:solidFill>
+            <a:headEnd type="none" w="med" len="med"/>
+            <a:tailEnd type="arrow" w="med" len="med"/>
+          </a:ln>
+          <a:effectLst/>
+        </p:spPr>
+        <p:style>
+          <a:lnRef idx="1">
+            <a:schemeClr val="accent2"/>
+          </a:lnRef>
+          <a:fillRef idx="2">
+            <a:schemeClr val="accent2"/>
+          </a:fillRef>
+          <a:effectRef idx="1">
+            <a:schemeClr val="accent2"/>
+          </a:effectRef>
+          <a:fontRef idx="minor">
+            <a:schemeClr val="dk1"/>
+          </a:fontRef>
+        </p:style>
+      </p:cxnSp>
+      <p:sp>
+        <p:nvSpPr>
+          <p:cNvPr id="74" name="Flowchart: Decision 96">
+            <a:extLst>
+              <a:ext uri="{FF2B5EF4-FFF2-40B4-BE49-F238E27FC236}">
+                <a16:creationId xmlns:a16="http://schemas.microsoft.com/office/drawing/2014/main" id="{F6073027-E54D-44DE-869C-02E7817B2F12}"/>
+              </a:ext>
+            </a:extLst>
+          </p:cNvPr>
+          <p:cNvSpPr/>
+          <p:nvPr/>
+        </p:nvSpPr>
+        <p:spPr>
+          <a:xfrm>
+            <a:off x="1501282" y="2794749"/>
+            <a:ext cx="236048" cy="173380"/>
+          </a:xfrm>
+          <a:prstGeom prst="flowChartDecision">
+            <a:avLst/>
+          </a:prstGeom>
+          <a:noFill/>
+          <a:ln w="19050">
+            <a:solidFill>
+              <a:srgbClr val="7030A0"/>
+            </a:solidFill>
+          </a:ln>
+          <a:effectLst/>
+        </p:spPr>
+        <p:style>
+          <a:lnRef idx="1">
+            <a:schemeClr val="accent6"/>
+          </a:lnRef>
+          <a:fillRef idx="2">
+            <a:schemeClr val="accent6"/>
+          </a:fillRef>
+          <a:effectRef idx="1">
+            <a:schemeClr val="accent6"/>
+          </a:effectRef>
+          <a:fontRef idx="minor">
+            <a:schemeClr val="dk1"/>
+          </a:fontRef>
+        </p:style>
+        <p:txBody>
+          <a:bodyPr rtlCol="0" anchor="ctr"/>
+          <a:lstStyle/>
+          <a:p>
+            <a:pPr algn="ctr"/>
+            <a:endParaRPr lang="en-US" sz="1050"/>
+          </a:p>
+        </p:txBody>
+      </p:sp>
+      <p:sp>
+        <p:nvSpPr>
+          <p:cNvPr id="77" name="TextBox 76">
+            <a:extLst>
+              <a:ext uri="{FF2B5EF4-FFF2-40B4-BE49-F238E27FC236}">
+                <a16:creationId xmlns:a16="http://schemas.microsoft.com/office/drawing/2014/main" id="{EF855914-52C4-4A09-94ED-87B8A61A3B1E}"/>
+              </a:ext>
+            </a:extLst>
+          </p:cNvPr>
+          <p:cNvSpPr txBox="1"/>
+          <p:nvPr/>
+        </p:nvSpPr>
+        <p:spPr>
+          <a:xfrm>
+            <a:off x="1686364" y="2635121"/>
+            <a:ext cx="170110" cy="137542"/>
+          </a:xfrm>
+          <a:prstGeom prst="rect">
+            <a:avLst/>
+          </a:prstGeom>
+          <a:noFill/>
+        </p:spPr>
+        <p:txBody>
+          <a:bodyPr wrap="square" lIns="0" tIns="0" rIns="0" bIns="0" rtlCol="0">
+            <a:noAutofit/>
+          </a:bodyPr>
+          <a:lstStyle/>
+          <a:p>
+            <a:pPr algn="ctr"/>
+            <a:r>
+              <a:rPr lang="en-US" sz="1100">
+                <a:solidFill>
+                  <a:srgbClr val="7030A0"/>
+                </a:solidFill>
+              </a:rPr>
+              <a:t>1</a:t>
+            </a:r>
+            <a:endParaRPr lang="en-SG" sz="1100" dirty="0">
+              <a:solidFill>
+                <a:srgbClr val="7030A0"/>
+              </a:solidFill>
+            </a:endParaRPr>
+          </a:p>
+        </p:txBody>
+      </p:sp>
+      <p:sp>
+        <p:nvSpPr>
+          <p:cNvPr id="82" name="Rectangle 8">
+            <a:extLst>
+              <a:ext uri="{FF2B5EF4-FFF2-40B4-BE49-F238E27FC236}">
+                <a16:creationId xmlns:a16="http://schemas.microsoft.com/office/drawing/2014/main" id="{15389110-894E-414B-A5E6-F09870BBB5D2}"/>
+              </a:ext>
+            </a:extLst>
+          </p:cNvPr>
+          <p:cNvSpPr/>
+          <p:nvPr/>
+        </p:nvSpPr>
+        <p:spPr>
+          <a:xfrm>
+            <a:off x="3084502" y="2738015"/>
+            <a:ext cx="926793" cy="346760"/>
+          </a:xfrm>
+          <a:prstGeom prst="rect">
+            <a:avLst/>
+          </a:prstGeom>
+          <a:ln w="19050">
+            <a:solidFill>
+              <a:srgbClr val="7030A0"/>
+            </a:solidFill>
+          </a:ln>
+          <a:effectLst/>
+        </p:spPr>
+        <p:style>
+          <a:lnRef idx="1">
+            <a:schemeClr val="accent4"/>
+          </a:lnRef>
+          <a:fillRef idx="2">
+            <a:schemeClr val="accent4"/>
+          </a:fillRef>
+          <a:effectRef idx="1">
+            <a:schemeClr val="accent4"/>
+          </a:effectRef>
+          <a:fontRef idx="minor">
+            <a:schemeClr val="dk1"/>
+          </a:fontRef>
+        </p:style>
+        <p:txBody>
+          <a:bodyPr rtlCol="0" anchor="ctr"/>
+          <a:lstStyle/>
+          <a:p>
+            <a:pPr algn="ctr"/>
+            <a:r>
+              <a:rPr lang="en-US" sz="1050" dirty="0" err="1">
+                <a:solidFill>
+                  <a:srgbClr val="7030A0"/>
+                </a:solidFill>
+              </a:rPr>
+              <a:t>UniqueLeaveList</a:t>
+            </a:r>
+            <a:endParaRPr lang="en-SG" sz="1050" dirty="0">
+              <a:solidFill>
+                <a:srgbClr val="7030A0"/>
+              </a:solidFill>
+            </a:endParaRPr>
+          </a:p>
+        </p:txBody>
+      </p:sp>
+      <p:sp>
+        <p:nvSpPr>
+          <p:cNvPr id="87" name="Flowchart: Decision 96">
+            <a:extLst>
+              <a:ext uri="{FF2B5EF4-FFF2-40B4-BE49-F238E27FC236}">
+                <a16:creationId xmlns:a16="http://schemas.microsoft.com/office/drawing/2014/main" id="{B4B3F883-AC84-4378-A185-5E399BA3B6AB}"/>
+              </a:ext>
+            </a:extLst>
+          </p:cNvPr>
+          <p:cNvSpPr/>
+          <p:nvPr/>
+        </p:nvSpPr>
+        <p:spPr>
+          <a:xfrm>
+            <a:off x="2704688" y="2804746"/>
+            <a:ext cx="236048" cy="173380"/>
+          </a:xfrm>
+          <a:prstGeom prst="flowChartDecision">
+            <a:avLst/>
+          </a:prstGeom>
+          <a:solidFill>
+            <a:srgbClr val="7030A0"/>
+          </a:solidFill>
+          <a:ln w="19050">
+            <a:solidFill>
+              <a:srgbClr val="7030A0"/>
+            </a:solidFill>
+          </a:ln>
+          <a:effectLst/>
+        </p:spPr>
+        <p:style>
+          <a:lnRef idx="1">
+            <a:schemeClr val="accent6"/>
+          </a:lnRef>
+          <a:fillRef idx="2">
+            <a:schemeClr val="accent6"/>
+          </a:fillRef>
+          <a:effectRef idx="1">
+            <a:schemeClr val="accent6"/>
+          </a:effectRef>
+          <a:fontRef idx="minor">
+            <a:schemeClr val="dk1"/>
+          </a:fontRef>
+        </p:style>
+        <p:txBody>
+          <a:bodyPr rtlCol="0" anchor="ctr"/>
+          <a:lstStyle/>
+          <a:p>
+            <a:pPr algn="ctr"/>
+            <a:endParaRPr lang="en-US" sz="1050"/>
+          </a:p>
+        </p:txBody>
+      </p:sp>
+      <p:sp>
+        <p:nvSpPr>
+          <p:cNvPr id="88" name="TextBox 87">
+            <a:extLst>
+              <a:ext uri="{FF2B5EF4-FFF2-40B4-BE49-F238E27FC236}">
+                <a16:creationId xmlns:a16="http://schemas.microsoft.com/office/drawing/2014/main" id="{4D98388B-3FF2-4ACF-AB2D-68DC5DE64DA2}"/>
+              </a:ext>
+            </a:extLst>
+          </p:cNvPr>
+          <p:cNvSpPr txBox="1"/>
+          <p:nvPr/>
+        </p:nvSpPr>
+        <p:spPr>
+          <a:xfrm>
+            <a:off x="2910938" y="2956122"/>
+            <a:ext cx="189257" cy="178683"/>
+          </a:xfrm>
+          <a:prstGeom prst="rect">
+            <a:avLst/>
+          </a:prstGeom>
+          <a:noFill/>
+        </p:spPr>
+        <p:txBody>
+          <a:bodyPr wrap="square" lIns="0" tIns="0" rIns="0" bIns="0" rtlCol="0">
+            <a:noAutofit/>
+          </a:bodyPr>
+          <a:lstStyle/>
+          <a:p>
+            <a:pPr algn="ctr"/>
+            <a:r>
+              <a:rPr lang="en-US" sz="1100" dirty="0">
+                <a:solidFill>
+                  <a:srgbClr val="7030A0"/>
+                </a:solidFill>
+              </a:rPr>
+              <a:t>1</a:t>
+            </a:r>
+            <a:endParaRPr lang="en-SG" sz="1100" dirty="0">
+              <a:solidFill>
+                <a:srgbClr val="7030A0"/>
+              </a:solidFill>
+            </a:endParaRPr>
+          </a:p>
+        </p:txBody>
+      </p:sp>
+      <p:cxnSp>
+        <p:nvCxnSpPr>
+          <p:cNvPr id="89" name="Straight Arrow Connector 88">
+            <a:extLst>
+              <a:ext uri="{FF2B5EF4-FFF2-40B4-BE49-F238E27FC236}">
+                <a16:creationId xmlns:a16="http://schemas.microsoft.com/office/drawing/2014/main" id="{863270F7-B7DD-4536-A694-31C116001266}"/>
+              </a:ext>
+            </a:extLst>
+          </p:cNvPr>
+          <p:cNvCxnSpPr>
+            <a:cxnSpLocks/>
+            <a:stCxn id="87" idx="1"/>
+          </p:cNvCxnSpPr>
+          <p:nvPr/>
+        </p:nvCxnSpPr>
+        <p:spPr>
+          <a:xfrm>
+            <a:off x="2704688" y="2891436"/>
+            <a:ext cx="367678" cy="12320"/>
+          </a:xfrm>
+          <a:prstGeom prst="straightConnector1">
+            <a:avLst/>
+          </a:prstGeom>
+          <a:ln w="19050">
+            <a:solidFill>
+              <a:srgbClr val="7030A0"/>
+            </a:solidFill>
+            <a:headEnd type="none" w="med" len="med"/>
+            <a:tailEnd type="arrow" w="med" len="med"/>
+          </a:ln>
+          <a:effectLst/>
+        </p:spPr>
+        <p:style>
+          <a:lnRef idx="1">
+            <a:schemeClr val="accent2"/>
+          </a:lnRef>
+          <a:fillRef idx="2">
+            <a:schemeClr val="accent2"/>
+          </a:fillRef>
+          <a:effectRef idx="1">
+            <a:schemeClr val="accent2"/>
+          </a:effectRef>
+          <a:fontRef idx="minor">
+            <a:schemeClr val="dk1"/>
+          </a:fontRef>
+        </p:style>
+      </p:cxnSp>
+      <p:sp>
+        <p:nvSpPr>
+          <p:cNvPr id="96" name="Flowchart: Decision 96">
+            <a:extLst>
+              <a:ext uri="{FF2B5EF4-FFF2-40B4-BE49-F238E27FC236}">
+                <a16:creationId xmlns:a16="http://schemas.microsoft.com/office/drawing/2014/main" id="{642F54D9-C25F-41F5-ADE7-537232E81C21}"/>
+              </a:ext>
+            </a:extLst>
+          </p:cNvPr>
+          <p:cNvSpPr/>
+          <p:nvPr/>
+        </p:nvSpPr>
+        <p:spPr>
+          <a:xfrm>
+            <a:off x="4021923" y="2817066"/>
+            <a:ext cx="236048" cy="173380"/>
+          </a:xfrm>
+          <a:prstGeom prst="flowChartDecision">
+            <a:avLst/>
+          </a:prstGeom>
+          <a:noFill/>
+          <a:ln w="19050">
+            <a:solidFill>
+              <a:srgbClr val="7030A0"/>
+            </a:solidFill>
+          </a:ln>
+          <a:effectLst/>
+        </p:spPr>
+        <p:style>
+          <a:lnRef idx="1">
+            <a:schemeClr val="accent6"/>
+          </a:lnRef>
+          <a:fillRef idx="2">
+            <a:schemeClr val="accent6"/>
+          </a:fillRef>
+          <a:effectRef idx="1">
+            <a:schemeClr val="accent6"/>
+          </a:effectRef>
+          <a:fontRef idx="minor">
+            <a:schemeClr val="dk1"/>
+          </a:fontRef>
+        </p:style>
+        <p:txBody>
+          <a:bodyPr rtlCol="0" anchor="ctr"/>
+          <a:lstStyle/>
+          <a:p>
+            <a:pPr algn="ctr"/>
+            <a:endParaRPr lang="en-US" sz="1050"/>
+          </a:p>
+        </p:txBody>
+      </p:sp>
+      <p:cxnSp>
+        <p:nvCxnSpPr>
+          <p:cNvPr id="97" name="Elbow Connector 63">
+            <a:extLst>
+              <a:ext uri="{FF2B5EF4-FFF2-40B4-BE49-F238E27FC236}">
+                <a16:creationId xmlns:a16="http://schemas.microsoft.com/office/drawing/2014/main" id="{341A1BAC-B181-420F-9A5C-770D9072EC40}"/>
+              </a:ext>
+            </a:extLst>
+          </p:cNvPr>
+          <p:cNvCxnSpPr>
+            <a:cxnSpLocks/>
+            <a:stCxn id="96" idx="3"/>
+          </p:cNvCxnSpPr>
+          <p:nvPr/>
+        </p:nvCxnSpPr>
+        <p:spPr>
+          <a:xfrm>
+            <a:off x="4257971" y="2903756"/>
+            <a:ext cx="145274" cy="5131"/>
+          </a:xfrm>
+          <a:prstGeom prst="bentConnector3">
+            <a:avLst/>
+          </a:prstGeom>
+          <a:ln w="19050">
+            <a:solidFill>
+              <a:srgbClr val="7030A0"/>
+            </a:solidFill>
+            <a:headEnd type="none" w="med" len="med"/>
+            <a:tailEnd type="arrow" w="med" len="med"/>
+          </a:ln>
+          <a:effectLst/>
+        </p:spPr>
+        <p:style>
+          <a:lnRef idx="1">
+            <a:schemeClr val="accent2"/>
+          </a:lnRef>
+          <a:fillRef idx="2">
+            <a:schemeClr val="accent2"/>
+          </a:fillRef>
+          <a:effectRef idx="1">
+            <a:schemeClr val="accent2"/>
+          </a:effectRef>
+          <a:fontRef idx="minor">
+            <a:schemeClr val="dk1"/>
+          </a:fontRef>
+        </p:style>
+      </p:cxnSp>
+      <p:sp>
+        <p:nvSpPr>
+          <p:cNvPr id="98" name="TextBox 97">
+            <a:extLst>
+              <a:ext uri="{FF2B5EF4-FFF2-40B4-BE49-F238E27FC236}">
+                <a16:creationId xmlns:a16="http://schemas.microsoft.com/office/drawing/2014/main" id="{BC0E9DCA-8A59-4E43-B8CC-B59C723157A4}"/>
+              </a:ext>
+            </a:extLst>
+          </p:cNvPr>
+          <p:cNvSpPr txBox="1"/>
+          <p:nvPr/>
+        </p:nvSpPr>
+        <p:spPr>
+          <a:xfrm>
+            <a:off x="4255709" y="2989425"/>
+            <a:ext cx="189257" cy="178683"/>
+          </a:xfrm>
+          <a:prstGeom prst="rect">
+            <a:avLst/>
+          </a:prstGeom>
+          <a:noFill/>
+        </p:spPr>
+        <p:txBody>
+          <a:bodyPr wrap="square" lIns="0" tIns="0" rIns="0" bIns="0" rtlCol="0">
+            <a:noAutofit/>
+          </a:bodyPr>
+          <a:lstStyle/>
+          <a:p>
+            <a:pPr algn="ctr"/>
+            <a:r>
+              <a:rPr lang="en-US" sz="1100" dirty="0">
+                <a:solidFill>
+                  <a:srgbClr val="7030A0"/>
+                </a:solidFill>
+              </a:rPr>
+              <a:t>*</a:t>
+            </a:r>
+            <a:endParaRPr lang="en-SG" sz="1100" dirty="0">
+              <a:solidFill>
+                <a:srgbClr val="7030A0"/>
+              </a:solidFill>
+            </a:endParaRPr>
+          </a:p>
+        </p:txBody>
+      </p:sp>
+      <p:sp>
+        <p:nvSpPr>
+          <p:cNvPr id="99" name="Rectangle 8">
+            <a:extLst>
+              <a:ext uri="{FF2B5EF4-FFF2-40B4-BE49-F238E27FC236}">
+                <a16:creationId xmlns:a16="http://schemas.microsoft.com/office/drawing/2014/main" id="{4593260B-2401-4A8B-8CA5-793493A5A5D2}"/>
+              </a:ext>
+            </a:extLst>
+          </p:cNvPr>
+          <p:cNvSpPr/>
+          <p:nvPr/>
+        </p:nvSpPr>
+        <p:spPr>
+          <a:xfrm>
+            <a:off x="4401309" y="2732168"/>
+            <a:ext cx="708186" cy="346760"/>
+          </a:xfrm>
+          <a:prstGeom prst="rect">
+            <a:avLst/>
+          </a:prstGeom>
+          <a:ln w="19050">
+            <a:solidFill>
+              <a:srgbClr val="7030A0"/>
+            </a:solidFill>
+          </a:ln>
+          <a:effectLst/>
+        </p:spPr>
+        <p:style>
+          <a:lnRef idx="1">
+            <a:schemeClr val="accent4"/>
+          </a:lnRef>
+          <a:fillRef idx="2">
+            <a:schemeClr val="accent4"/>
+          </a:fillRef>
+          <a:effectRef idx="1">
+            <a:schemeClr val="accent4"/>
+          </a:effectRef>
+          <a:fontRef idx="minor">
+            <a:schemeClr val="dk1"/>
+          </a:fontRef>
+        </p:style>
+        <p:txBody>
+          <a:bodyPr rtlCol="0" anchor="ctr"/>
+          <a:lstStyle/>
+          <a:p>
+            <a:pPr algn="ctr"/>
+            <a:r>
+              <a:rPr lang="en-US" sz="1050" dirty="0">
+                <a:solidFill>
+                  <a:srgbClr val="7030A0"/>
+                </a:solidFill>
+              </a:rPr>
+              <a:t>Leave</a:t>
+            </a:r>
+            <a:endParaRPr lang="en-SG" sz="1050" dirty="0">
+              <a:solidFill>
+                <a:srgbClr val="7030A0"/>
+              </a:solidFill>
+            </a:endParaRPr>
+          </a:p>
+        </p:txBody>
+      </p:sp>
+      <p:cxnSp>
+        <p:nvCxnSpPr>
+          <p:cNvPr id="100" name="Elbow Connector 106">
+            <a:extLst>
+              <a:ext uri="{FF2B5EF4-FFF2-40B4-BE49-F238E27FC236}">
+                <a16:creationId xmlns:a16="http://schemas.microsoft.com/office/drawing/2014/main" id="{4E8BE8DF-9D81-4027-9281-6EB7C54D31BE}"/>
+              </a:ext>
+            </a:extLst>
+          </p:cNvPr>
+          <p:cNvCxnSpPr>
+            <a:cxnSpLocks/>
+            <a:endCxn id="99" idx="0"/>
+          </p:cNvCxnSpPr>
+          <p:nvPr/>
+        </p:nvCxnSpPr>
+        <p:spPr>
+          <a:xfrm>
+            <a:off x="1465121" y="2560170"/>
+            <a:ext cx="3290281" cy="171998"/>
+          </a:xfrm>
+          <a:prstGeom prst="bentConnector2">
+            <a:avLst/>
+          </a:prstGeom>
+          <a:ln w="19050">
+            <a:solidFill>
+              <a:srgbClr val="7030A0"/>
+            </a:solidFill>
+            <a:prstDash val="solid"/>
+            <a:headEnd type="none" w="med" len="med"/>
+            <a:tailEnd type="arrow" w="med" len="med"/>
+          </a:ln>
+          <a:effectLst/>
+        </p:spPr>
+        <p:style>
+          <a:lnRef idx="1">
+            <a:schemeClr val="accent2"/>
+          </a:lnRef>
+          <a:fillRef idx="2">
+            <a:schemeClr val="accent2"/>
+          </a:fillRef>
+          <a:effectRef idx="1">
+            <a:schemeClr val="accent2"/>
+          </a:effectRef>
+          <a:fontRef idx="minor">
+            <a:schemeClr val="dk1"/>
+          </a:fontRef>
+        </p:style>
+      </p:cxnSp>
+      <p:sp>
+        <p:nvSpPr>
+          <p:cNvPr id="101" name="TextBox 100">
+            <a:extLst>
+              <a:ext uri="{FF2B5EF4-FFF2-40B4-BE49-F238E27FC236}">
+                <a16:creationId xmlns:a16="http://schemas.microsoft.com/office/drawing/2014/main" id="{5E3FD322-A717-42D3-BFA3-3F276E12AF0E}"/>
+              </a:ext>
+            </a:extLst>
+          </p:cNvPr>
+          <p:cNvSpPr txBox="1"/>
+          <p:nvPr/>
+        </p:nvSpPr>
+        <p:spPr>
+          <a:xfrm>
+            <a:off x="4544850" y="2560530"/>
+            <a:ext cx="189257" cy="178683"/>
+          </a:xfrm>
+          <a:prstGeom prst="rect">
+            <a:avLst/>
+          </a:prstGeom>
+          <a:noFill/>
+        </p:spPr>
+        <p:txBody>
+          <a:bodyPr wrap="square" lIns="0" tIns="0" rIns="0" bIns="0" rtlCol="0">
+            <a:noAutofit/>
+          </a:bodyPr>
+          <a:lstStyle/>
+          <a:p>
+            <a:pPr algn="ctr"/>
+            <a:r>
+              <a:rPr lang="en-US" sz="1100" dirty="0">
+                <a:solidFill>
+                  <a:srgbClr val="7030A0"/>
+                </a:solidFill>
+              </a:rPr>
+              <a:t>1</a:t>
+            </a:r>
+            <a:endParaRPr lang="en-SG" sz="1100" dirty="0">
+              <a:solidFill>
+                <a:srgbClr val="7030A0"/>
+              </a:solidFill>
+            </a:endParaRPr>
+          </a:p>
+        </p:txBody>
+      </p:sp>
+      <p:sp>
+        <p:nvSpPr>
+          <p:cNvPr id="102" name="TextBox 101">
+            <a:extLst>
+              <a:ext uri="{FF2B5EF4-FFF2-40B4-BE49-F238E27FC236}">
+                <a16:creationId xmlns:a16="http://schemas.microsoft.com/office/drawing/2014/main" id="{1F8BF352-55EA-4278-B62D-7086B88D5093}"/>
+              </a:ext>
+            </a:extLst>
+          </p:cNvPr>
+          <p:cNvSpPr txBox="1"/>
+          <p:nvPr/>
+        </p:nvSpPr>
+        <p:spPr>
+          <a:xfrm>
+            <a:off x="3986889" y="2344603"/>
+            <a:ext cx="881018" cy="261610"/>
+          </a:xfrm>
+          <a:prstGeom prst="rect">
+            <a:avLst/>
+          </a:prstGeom>
+          <a:noFill/>
+        </p:spPr>
+        <p:txBody>
+          <a:bodyPr wrap="square" rtlCol="0">
+            <a:spAutoFit/>
+          </a:bodyPr>
+          <a:lstStyle/>
+          <a:p>
+            <a:pPr algn="r"/>
+            <a:r>
+              <a:rPr lang="en-US" sz="1100" dirty="0">
+                <a:solidFill>
+                  <a:srgbClr val="7030A0"/>
+                </a:solidFill>
+              </a:rPr>
+              <a:t>filtered list</a:t>
+            </a:r>
+            <a:endParaRPr lang="en-SG" sz="1100" dirty="0">
+              <a:solidFill>
+                <a:srgbClr val="7030A0"/>
+              </a:solidFill>
+            </a:endParaRPr>
+          </a:p>
+        </p:txBody>
+      </p:sp>
+      <p:sp>
+        <p:nvSpPr>
+          <p:cNvPr id="112" name="Flowchart: Decision 96">
+            <a:extLst>
+              <a:ext uri="{FF2B5EF4-FFF2-40B4-BE49-F238E27FC236}">
+                <a16:creationId xmlns:a16="http://schemas.microsoft.com/office/drawing/2014/main" id="{24786D9F-44A1-4A62-855E-7A15654DEB1E}"/>
+              </a:ext>
+            </a:extLst>
+          </p:cNvPr>
+          <p:cNvSpPr/>
+          <p:nvPr/>
+        </p:nvSpPr>
+        <p:spPr>
+          <a:xfrm>
+            <a:off x="5119807" y="2842863"/>
+            <a:ext cx="236048" cy="173380"/>
+          </a:xfrm>
+          <a:prstGeom prst="flowChartDecision">
+            <a:avLst/>
+          </a:prstGeom>
+          <a:solidFill>
+            <a:srgbClr val="7030A0"/>
+          </a:solidFill>
+          <a:ln w="19050">
+            <a:solidFill>
+              <a:srgbClr val="7030A0"/>
+            </a:solidFill>
+          </a:ln>
+          <a:effectLst/>
+        </p:spPr>
+        <p:style>
+          <a:lnRef idx="1">
+            <a:schemeClr val="accent6"/>
+          </a:lnRef>
+          <a:fillRef idx="2">
+            <a:schemeClr val="accent6"/>
+          </a:fillRef>
+          <a:effectRef idx="1">
+            <a:schemeClr val="accent6"/>
+          </a:effectRef>
+          <a:fontRef idx="minor">
+            <a:schemeClr val="dk1"/>
+          </a:fontRef>
+        </p:style>
+        <p:txBody>
+          <a:bodyPr rtlCol="0" anchor="ctr"/>
+          <a:lstStyle/>
+          <a:p>
+            <a:pPr algn="ctr"/>
+            <a:endParaRPr lang="en-US" sz="1050"/>
+          </a:p>
+        </p:txBody>
+      </p:sp>
+      <p:cxnSp>
+        <p:nvCxnSpPr>
+          <p:cNvPr id="113" name="Elbow Connector 80">
+            <a:extLst>
+              <a:ext uri="{FF2B5EF4-FFF2-40B4-BE49-F238E27FC236}">
+                <a16:creationId xmlns:a16="http://schemas.microsoft.com/office/drawing/2014/main" id="{0366F803-A1A8-41CE-BFE0-F2E503A732BF}"/>
+              </a:ext>
+            </a:extLst>
+          </p:cNvPr>
+          <p:cNvCxnSpPr>
+            <a:cxnSpLocks/>
+          </p:cNvCxnSpPr>
+          <p:nvPr/>
+        </p:nvCxnSpPr>
+        <p:spPr>
+          <a:xfrm flipV="1">
+            <a:off x="5348129" y="2929872"/>
+            <a:ext cx="276768" cy="1"/>
+          </a:xfrm>
+          <a:prstGeom prst="bentConnector3">
+            <a:avLst/>
+          </a:prstGeom>
+          <a:ln w="19050">
+            <a:solidFill>
+              <a:srgbClr val="7030A0"/>
+            </a:solidFill>
+            <a:headEnd type="none" w="med" len="med"/>
+            <a:tailEnd type="arrow" w="med" len="med"/>
+          </a:ln>
+          <a:effectLst/>
+        </p:spPr>
+        <p:style>
+          <a:lnRef idx="1">
+            <a:schemeClr val="accent2"/>
+          </a:lnRef>
+          <a:fillRef idx="2">
+            <a:schemeClr val="accent2"/>
+          </a:fillRef>
+          <a:effectRef idx="1">
+            <a:schemeClr val="accent2"/>
+          </a:effectRef>
+          <a:fontRef idx="minor">
+            <a:schemeClr val="dk1"/>
+          </a:fontRef>
+        </p:style>
+      </p:cxnSp>
+      <p:cxnSp>
+        <p:nvCxnSpPr>
+          <p:cNvPr id="115" name="Elbow Connector 78">
+            <a:extLst>
+              <a:ext uri="{FF2B5EF4-FFF2-40B4-BE49-F238E27FC236}">
+                <a16:creationId xmlns:a16="http://schemas.microsoft.com/office/drawing/2014/main" id="{3E243CBE-A4F3-4187-BDE1-1AB1A747AD32}"/>
+              </a:ext>
+            </a:extLst>
+          </p:cNvPr>
+          <p:cNvCxnSpPr>
+            <a:cxnSpLocks/>
+            <a:endCxn id="121" idx="1"/>
+          </p:cNvCxnSpPr>
+          <p:nvPr/>
+        </p:nvCxnSpPr>
+        <p:spPr>
+          <a:xfrm rot="16200000" flipH="1">
+            <a:off x="5168534" y="2834744"/>
+            <a:ext cx="703321" cy="179898"/>
+          </a:xfrm>
+          <a:prstGeom prst="bentConnector2">
+            <a:avLst/>
+          </a:prstGeom>
+          <a:ln w="19050">
+            <a:solidFill>
+              <a:srgbClr val="7030A0"/>
+            </a:solidFill>
+            <a:headEnd type="none" w="med" len="med"/>
+            <a:tailEnd type="arrow" w="med" len="med"/>
+          </a:ln>
+          <a:effectLst/>
+        </p:spPr>
+        <p:style>
+          <a:lnRef idx="1">
+            <a:schemeClr val="accent2"/>
+          </a:lnRef>
+          <a:fillRef idx="2">
+            <a:schemeClr val="accent2"/>
+          </a:fillRef>
+          <a:effectRef idx="1">
+            <a:schemeClr val="accent2"/>
+          </a:effectRef>
+          <a:fontRef idx="minor">
+            <a:schemeClr val="dk1"/>
+          </a:fontRef>
+        </p:style>
+      </p:cxnSp>
+      <p:sp>
+        <p:nvSpPr>
+          <p:cNvPr id="116" name="Rectangle 8">
+            <a:extLst>
+              <a:ext uri="{FF2B5EF4-FFF2-40B4-BE49-F238E27FC236}">
+                <a16:creationId xmlns:a16="http://schemas.microsoft.com/office/drawing/2014/main" id="{2FE62294-02DA-4DBD-8013-DE39AC365EA6}"/>
+              </a:ext>
+            </a:extLst>
+          </p:cNvPr>
+          <p:cNvSpPr/>
+          <p:nvPr/>
+        </p:nvSpPr>
+        <p:spPr>
+          <a:xfrm>
+            <a:off x="5608664" y="2776386"/>
+            <a:ext cx="893949" cy="285783"/>
+          </a:xfrm>
+          <a:prstGeom prst="rect">
+            <a:avLst/>
+          </a:prstGeom>
+          <a:ln w="19050">
+            <a:solidFill>
+              <a:srgbClr val="7030A0"/>
+            </a:solidFill>
+          </a:ln>
+          <a:effectLst/>
+        </p:spPr>
+        <p:style>
+          <a:lnRef idx="1">
+            <a:schemeClr val="accent4"/>
+          </a:lnRef>
+          <a:fillRef idx="2">
+            <a:schemeClr val="accent4"/>
+          </a:fillRef>
+          <a:effectRef idx="1">
+            <a:schemeClr val="accent4"/>
+          </a:effectRef>
+          <a:fontRef idx="minor">
+            <a:schemeClr val="dk1"/>
+          </a:fontRef>
+        </p:style>
+        <p:txBody>
+          <a:bodyPr rtlCol="0" anchor="ctr"/>
+          <a:lstStyle/>
+          <a:p>
+            <a:pPr algn="ctr"/>
+            <a:r>
+              <a:rPr lang="en-SG" sz="1050" dirty="0">
+                <a:solidFill>
+                  <a:srgbClr val="7030A0"/>
+                </a:solidFill>
+              </a:rPr>
+              <a:t>Date</a:t>
+            </a:r>
+          </a:p>
+        </p:txBody>
+      </p:sp>
+      <p:sp>
+        <p:nvSpPr>
+          <p:cNvPr id="117" name="Rectangle 8">
+            <a:extLst>
+              <a:ext uri="{FF2B5EF4-FFF2-40B4-BE49-F238E27FC236}">
+                <a16:creationId xmlns:a16="http://schemas.microsoft.com/office/drawing/2014/main" id="{48CF809F-C024-47FF-8E78-A98B20145B78}"/>
+              </a:ext>
+            </a:extLst>
+          </p:cNvPr>
+          <p:cNvSpPr/>
+          <p:nvPr/>
+        </p:nvSpPr>
+        <p:spPr>
+          <a:xfrm>
+            <a:off x="5602534" y="2389544"/>
+            <a:ext cx="893949" cy="285783"/>
+          </a:xfrm>
+          <a:prstGeom prst="rect">
+            <a:avLst/>
+          </a:prstGeom>
+          <a:ln w="19050">
+            <a:solidFill>
+              <a:srgbClr val="7030A0"/>
+            </a:solidFill>
+          </a:ln>
+          <a:effectLst/>
+        </p:spPr>
+        <p:style>
+          <a:lnRef idx="1">
+            <a:schemeClr val="accent4"/>
+          </a:lnRef>
+          <a:fillRef idx="2">
+            <a:schemeClr val="accent4"/>
+          </a:fillRef>
+          <a:effectRef idx="1">
+            <a:schemeClr val="accent4"/>
+          </a:effectRef>
+          <a:fontRef idx="minor">
+            <a:schemeClr val="dk1"/>
+          </a:fontRef>
+        </p:style>
+        <p:txBody>
+          <a:bodyPr rtlCol="0" anchor="ctr"/>
+          <a:lstStyle/>
+          <a:p>
+            <a:pPr algn="ctr"/>
+            <a:r>
+              <a:rPr lang="en-SG" sz="1050" dirty="0">
+                <a:solidFill>
+                  <a:srgbClr val="7030A0"/>
+                </a:solidFill>
+              </a:rPr>
+              <a:t>Employee ID</a:t>
+            </a:r>
+          </a:p>
+        </p:txBody>
+      </p:sp>
+      <p:sp>
+        <p:nvSpPr>
+          <p:cNvPr id="121" name="Rectangle 8">
+            <a:extLst>
+              <a:ext uri="{FF2B5EF4-FFF2-40B4-BE49-F238E27FC236}">
+                <a16:creationId xmlns:a16="http://schemas.microsoft.com/office/drawing/2014/main" id="{80590F46-AEA5-43A7-867D-4E4E8467665D}"/>
+              </a:ext>
+            </a:extLst>
+          </p:cNvPr>
+          <p:cNvSpPr/>
+          <p:nvPr/>
+        </p:nvSpPr>
+        <p:spPr>
+          <a:xfrm>
+            <a:off x="5610143" y="3133462"/>
+            <a:ext cx="893949" cy="285783"/>
+          </a:xfrm>
+          <a:prstGeom prst="rect">
+            <a:avLst/>
+          </a:prstGeom>
+          <a:ln w="19050">
+            <a:solidFill>
+              <a:srgbClr val="7030A0"/>
+            </a:solidFill>
+          </a:ln>
+          <a:effectLst/>
+        </p:spPr>
+        <p:style>
+          <a:lnRef idx="1">
+            <a:schemeClr val="accent4"/>
+          </a:lnRef>
+          <a:fillRef idx="2">
+            <a:schemeClr val="accent4"/>
+          </a:fillRef>
+          <a:effectRef idx="1">
+            <a:schemeClr val="accent4"/>
+          </a:effectRef>
+          <a:fontRef idx="minor">
+            <a:schemeClr val="dk1"/>
+          </a:fontRef>
+        </p:style>
+        <p:txBody>
+          <a:bodyPr rtlCol="0" anchor="ctr"/>
+          <a:lstStyle/>
+          <a:p>
+            <a:pPr algn="ctr"/>
+            <a:r>
+              <a:rPr lang="en-SG" sz="1050" dirty="0">
+                <a:solidFill>
+                  <a:srgbClr val="7030A0"/>
+                </a:solidFill>
+              </a:rPr>
+              <a:t>Approval</a:t>
+            </a:r>
+          </a:p>
+        </p:txBody>
+      </p:sp>
+      <p:cxnSp>
+        <p:nvCxnSpPr>
+          <p:cNvPr id="123" name="Elbow Connector 83">
+            <a:extLst>
+              <a:ext uri="{FF2B5EF4-FFF2-40B4-BE49-F238E27FC236}">
+                <a16:creationId xmlns:a16="http://schemas.microsoft.com/office/drawing/2014/main" id="{3AB7ABF3-AC66-426F-9FD8-0D54BC4B3313}"/>
+              </a:ext>
+            </a:extLst>
+          </p:cNvPr>
+          <p:cNvCxnSpPr>
+            <a:cxnSpLocks/>
+            <a:endCxn id="117" idx="1"/>
+          </p:cNvCxnSpPr>
+          <p:nvPr/>
+        </p:nvCxnSpPr>
+        <p:spPr>
+          <a:xfrm rot="5400000" flipH="1" flipV="1">
+            <a:off x="5319410" y="2644977"/>
+            <a:ext cx="395665" cy="170584"/>
+          </a:xfrm>
+          <a:prstGeom prst="bentConnector2">
+            <a:avLst/>
+          </a:prstGeom>
+          <a:ln w="19050">
+            <a:solidFill>
+              <a:srgbClr val="7030A0"/>
+            </a:solidFill>
+            <a:headEnd type="none" w="med" len="med"/>
+            <a:tailEnd type="arrow" w="med" len="med"/>
+          </a:ln>
+          <a:effectLst/>
+        </p:spPr>
+        <p:style>
+          <a:lnRef idx="1">
+            <a:schemeClr val="accent2"/>
+          </a:lnRef>
+          <a:fillRef idx="2">
+            <a:schemeClr val="accent2"/>
+          </a:fillRef>
+          <a:effectRef idx="1">
+            <a:schemeClr val="accent2"/>
+          </a:effectRef>
+          <a:fontRef idx="minor">
+            <a:schemeClr val="dk1"/>
+          </a:fontRef>
+        </p:style>
+      </p:cxnSp>
+      <p:cxnSp>
+        <p:nvCxnSpPr>
+          <p:cNvPr id="125" name="Elbow Connector 63">
+            <a:extLst>
+              <a:ext uri="{FF2B5EF4-FFF2-40B4-BE49-F238E27FC236}">
+                <a16:creationId xmlns:a16="http://schemas.microsoft.com/office/drawing/2014/main" id="{2020541A-FFA3-4FFF-8473-D01F38AD6494}"/>
+              </a:ext>
+            </a:extLst>
+          </p:cNvPr>
+          <p:cNvCxnSpPr>
+            <a:cxnSpLocks/>
+            <a:stCxn id="126" idx="3"/>
+            <a:endCxn id="60" idx="2"/>
+          </p:cNvCxnSpPr>
+          <p:nvPr/>
+        </p:nvCxnSpPr>
+        <p:spPr>
+          <a:xfrm rot="5400000" flipH="1" flipV="1">
+            <a:off x="2240758" y="3128098"/>
+            <a:ext cx="143316" cy="5969"/>
+          </a:xfrm>
+          <a:prstGeom prst="bentConnector3">
+            <a:avLst>
+              <a:gd name="adj1" fmla="val 50000"/>
+            </a:avLst>
+          </a:prstGeom>
+          <a:ln w="19050">
+            <a:solidFill>
+              <a:srgbClr val="7030A0"/>
+            </a:solidFill>
+            <a:prstDash val="sysDot"/>
+            <a:headEnd type="none" w="med" len="med"/>
+            <a:tailEnd type="none" w="med" len="med"/>
+          </a:ln>
+          <a:effectLst/>
+        </p:spPr>
+        <p:style>
+          <a:lnRef idx="1">
+            <a:schemeClr val="accent2"/>
+          </a:lnRef>
+          <a:fillRef idx="2">
+            <a:schemeClr val="accent2"/>
+          </a:fillRef>
+          <a:effectRef idx="1">
+            <a:schemeClr val="accent2"/>
+          </a:effectRef>
+          <a:fontRef idx="minor">
+            <a:schemeClr val="dk1"/>
+          </a:fontRef>
+        </p:style>
+      </p:cxnSp>
+      <p:sp>
+        <p:nvSpPr>
+          <p:cNvPr id="126" name="Isosceles Triangle 102">
+            <a:extLst>
+              <a:ext uri="{FF2B5EF4-FFF2-40B4-BE49-F238E27FC236}">
+                <a16:creationId xmlns:a16="http://schemas.microsoft.com/office/drawing/2014/main" id="{725D98C1-F454-4B35-9991-2601997D42E5}"/>
+              </a:ext>
+            </a:extLst>
+          </p:cNvPr>
+          <p:cNvSpPr/>
+          <p:nvPr/>
+        </p:nvSpPr>
+        <p:spPr>
+          <a:xfrm flipV="1">
+            <a:off x="2168238" y="3202740"/>
+            <a:ext cx="282387" cy="157062"/>
+          </a:xfrm>
+          <a:prstGeom prst="triangle">
+            <a:avLst/>
+          </a:prstGeom>
+          <a:ln w="19050">
+            <a:solidFill>
+              <a:srgbClr val="7030A0"/>
+            </a:solidFill>
+          </a:ln>
+          <a:effectLst/>
+        </p:spPr>
+        <p:style>
+          <a:lnRef idx="1">
+            <a:schemeClr val="accent4"/>
+          </a:lnRef>
+          <a:fillRef idx="2">
+            <a:schemeClr val="accent4"/>
+          </a:fillRef>
+          <a:effectRef idx="1">
+            <a:schemeClr val="accent4"/>
+          </a:effectRef>
+          <a:fontRef idx="minor">
+            <a:schemeClr val="dk1"/>
+          </a:fontRef>
+        </p:style>
+        <p:txBody>
+          <a:bodyPr rtlCol="0" anchor="ctr"/>
+          <a:lstStyle/>
+          <a:p>
+            <a:pPr algn="ctr"/>
+            <a:endParaRPr lang="en-SG" sz="1050" b="1">
+              <a:solidFill>
+                <a:srgbClr val="92D050"/>
+              </a:solidFill>
+            </a:endParaRPr>
+          </a:p>
+        </p:txBody>
+      </p:sp>
+      <p:sp>
+        <p:nvSpPr>
+          <p:cNvPr id="127" name="Rectangle 8">
+            <a:extLst>
+              <a:ext uri="{FF2B5EF4-FFF2-40B4-BE49-F238E27FC236}">
+                <a16:creationId xmlns:a16="http://schemas.microsoft.com/office/drawing/2014/main" id="{F106B895-2740-41B0-9B31-60C1A522CE0A}"/>
+              </a:ext>
+            </a:extLst>
+          </p:cNvPr>
+          <p:cNvSpPr/>
+          <p:nvPr/>
+        </p:nvSpPr>
+        <p:spPr>
+          <a:xfrm>
+            <a:off x="1797922" y="3379301"/>
+            <a:ext cx="1060683" cy="364396"/>
+          </a:xfrm>
+          <a:prstGeom prst="rect">
+            <a:avLst/>
+          </a:prstGeom>
+          <a:ln w="19050">
+            <a:solidFill>
+              <a:srgbClr val="7030A0"/>
+            </a:solidFill>
+          </a:ln>
+          <a:effectLst/>
+        </p:spPr>
+        <p:style>
+          <a:lnRef idx="1">
+            <a:schemeClr val="accent4"/>
+          </a:lnRef>
+          <a:fillRef idx="2">
+            <a:schemeClr val="accent4"/>
+          </a:fillRef>
+          <a:effectRef idx="1">
+            <a:schemeClr val="accent4"/>
+          </a:effectRef>
+          <a:fontRef idx="minor">
+            <a:schemeClr val="dk1"/>
+          </a:fontRef>
+        </p:style>
+        <p:txBody>
+          <a:bodyPr rtlCol="0" anchor="ctr"/>
+          <a:lstStyle/>
+          <a:p>
+            <a:pPr algn="ctr"/>
+            <a:r>
+              <a:rPr lang="en-US" sz="1050" dirty="0" err="1">
+                <a:solidFill>
+                  <a:srgbClr val="7030A0"/>
+                </a:solidFill>
+              </a:rPr>
+              <a:t>LeaveList</a:t>
+            </a:r>
+            <a:endParaRPr lang="en-SG" sz="1050" dirty="0">
+              <a:solidFill>
+                <a:srgbClr val="7030A0"/>
+              </a:solidFill>
+            </a:endParaRPr>
+          </a:p>
+        </p:txBody>
+      </p:sp>
+      <p:sp>
+        <p:nvSpPr>
+          <p:cNvPr id="128" name="Rectangle 8">
+            <a:extLst>
+              <a:ext uri="{FF2B5EF4-FFF2-40B4-BE49-F238E27FC236}">
+                <a16:creationId xmlns:a16="http://schemas.microsoft.com/office/drawing/2014/main" id="{1BE9F967-1C2D-4AD5-837F-81190A04C0FE}"/>
+              </a:ext>
+            </a:extLst>
+          </p:cNvPr>
+          <p:cNvSpPr/>
+          <p:nvPr/>
+        </p:nvSpPr>
+        <p:spPr>
+          <a:xfrm>
+            <a:off x="3325149" y="3387305"/>
+            <a:ext cx="1443661" cy="364396"/>
+          </a:xfrm>
+          <a:prstGeom prst="rect">
+            <a:avLst/>
+          </a:prstGeom>
+          <a:ln w="19050">
+            <a:solidFill>
+              <a:srgbClr val="7030A0"/>
+            </a:solidFill>
+          </a:ln>
+          <a:effectLst/>
+        </p:spPr>
+        <p:style>
+          <a:lnRef idx="1">
+            <a:schemeClr val="accent4"/>
+          </a:lnRef>
+          <a:fillRef idx="2">
+            <a:schemeClr val="accent4"/>
+          </a:fillRef>
+          <a:effectRef idx="1">
+            <a:schemeClr val="accent4"/>
+          </a:effectRef>
+          <a:fontRef idx="minor">
+            <a:schemeClr val="dk1"/>
+          </a:fontRef>
+        </p:style>
+        <p:txBody>
+          <a:bodyPr rtlCol="0" anchor="ctr"/>
+          <a:lstStyle/>
+          <a:p>
+            <a:pPr algn="ctr"/>
+            <a:r>
+              <a:rPr lang="en-US" sz="1050" dirty="0">
+                <a:solidFill>
+                  <a:srgbClr val="7030A0"/>
+                </a:solidFill>
+              </a:rPr>
+              <a:t>&lt;&lt;interface&gt;&gt;</a:t>
+            </a:r>
+            <a:br>
+              <a:rPr lang="en-US" sz="1050" dirty="0">
+                <a:solidFill>
+                  <a:srgbClr val="7030A0"/>
+                </a:solidFill>
+              </a:rPr>
+            </a:br>
+            <a:r>
+              <a:rPr lang="en-US" sz="1050">
+                <a:solidFill>
+                  <a:srgbClr val="7030A0"/>
+                </a:solidFill>
+              </a:rPr>
+              <a:t>ReadOnlyLeaveList</a:t>
+            </a:r>
+            <a:endParaRPr lang="en-SG" sz="1050" dirty="0">
+              <a:solidFill>
+                <a:srgbClr val="7030A0"/>
+              </a:solidFill>
+            </a:endParaRPr>
+          </a:p>
+        </p:txBody>
+      </p:sp>
+      <p:sp>
+        <p:nvSpPr>
+          <p:cNvPr id="129" name="Isosceles Triangle 102">
+            <a:extLst>
+              <a:ext uri="{FF2B5EF4-FFF2-40B4-BE49-F238E27FC236}">
+                <a16:creationId xmlns:a16="http://schemas.microsoft.com/office/drawing/2014/main" id="{B696141A-C2F2-458D-B7DD-5A899A8F0711}"/>
+              </a:ext>
+            </a:extLst>
+          </p:cNvPr>
+          <p:cNvSpPr/>
+          <p:nvPr/>
+        </p:nvSpPr>
+        <p:spPr>
+          <a:xfrm rot="5400000">
+            <a:off x="3089644" y="3490277"/>
+            <a:ext cx="271014" cy="187417"/>
+          </a:xfrm>
+          <a:prstGeom prst="triangle">
+            <a:avLst>
+              <a:gd name="adj" fmla="val 44517"/>
+            </a:avLst>
+          </a:prstGeom>
+          <a:solidFill>
+            <a:schemeClr val="accent4">
+              <a:lumMod val="20000"/>
+              <a:lumOff val="80000"/>
+            </a:schemeClr>
+          </a:solidFill>
+          <a:ln w="19050">
+            <a:solidFill>
+              <a:srgbClr val="7030A0"/>
+            </a:solidFill>
+          </a:ln>
+          <a:effectLst/>
+        </p:spPr>
+        <p:style>
+          <a:lnRef idx="1">
+            <a:schemeClr val="accent6"/>
+          </a:lnRef>
+          <a:fillRef idx="2">
+            <a:schemeClr val="accent6"/>
+          </a:fillRef>
+          <a:effectRef idx="1">
+            <a:schemeClr val="accent6"/>
+          </a:effectRef>
+          <a:fontRef idx="minor">
+            <a:schemeClr val="dk1"/>
+          </a:fontRef>
+        </p:style>
+        <p:txBody>
+          <a:bodyPr rtlCol="0" anchor="ctr"/>
+          <a:lstStyle/>
+          <a:p>
+            <a:pPr algn="ctr"/>
+            <a:endParaRPr lang="en-SG" sz="1050"/>
+          </a:p>
+        </p:txBody>
+      </p:sp>
+      <p:cxnSp>
+        <p:nvCxnSpPr>
+          <p:cNvPr id="130" name="Elbow Connector 63">
+            <a:extLst>
+              <a:ext uri="{FF2B5EF4-FFF2-40B4-BE49-F238E27FC236}">
+                <a16:creationId xmlns:a16="http://schemas.microsoft.com/office/drawing/2014/main" id="{DF9EB3FC-EE12-42CC-B835-1F1A815A3499}"/>
+              </a:ext>
+            </a:extLst>
+          </p:cNvPr>
+          <p:cNvCxnSpPr>
+            <a:cxnSpLocks/>
+          </p:cNvCxnSpPr>
+          <p:nvPr/>
+        </p:nvCxnSpPr>
+        <p:spPr>
+          <a:xfrm>
+            <a:off x="2866761" y="3583985"/>
+            <a:ext cx="271892" cy="2821"/>
+          </a:xfrm>
+          <a:prstGeom prst="bentConnector3">
+            <a:avLst>
+              <a:gd name="adj1" fmla="val 50000"/>
+            </a:avLst>
+          </a:prstGeom>
+          <a:ln w="19050">
+            <a:solidFill>
+              <a:srgbClr val="7030A0"/>
+            </a:solidFill>
+            <a:prstDash val="sysDot"/>
+            <a:headEnd type="none" w="med" len="med"/>
+            <a:tailEnd type="none" w="med" len="med"/>
+          </a:ln>
+          <a:effectLst/>
+        </p:spPr>
+        <p:style>
+          <a:lnRef idx="1">
+            <a:schemeClr val="accent2"/>
+          </a:lnRef>
+          <a:fillRef idx="2">
+            <a:schemeClr val="accent2"/>
+          </a:fillRef>
+          <a:effectRef idx="1">
+            <a:schemeClr val="accent2"/>
+          </a:effectRef>
+          <a:fontRef idx="minor">
+            <a:schemeClr val="dk1"/>
+          </a:fontRef>
+        </p:style>
+      </p:cxnSp>
+      <p:sp>
+        <p:nvSpPr>
+          <p:cNvPr id="131" name="Rectangle 8">
+            <a:extLst>
+              <a:ext uri="{FF2B5EF4-FFF2-40B4-BE49-F238E27FC236}">
+                <a16:creationId xmlns:a16="http://schemas.microsoft.com/office/drawing/2014/main" id="{142CDA00-E401-4070-BB16-76CF58A66996}"/>
+              </a:ext>
+            </a:extLst>
+          </p:cNvPr>
+          <p:cNvSpPr/>
+          <p:nvPr/>
+        </p:nvSpPr>
+        <p:spPr>
+          <a:xfrm>
+            <a:off x="6777644" y="956517"/>
+            <a:ext cx="893949" cy="285783"/>
+          </a:xfrm>
+          <a:prstGeom prst="rect">
+            <a:avLst/>
+          </a:prstGeom>
+          <a:ln w="19050">
+            <a:solidFill>
+              <a:srgbClr val="7030A0"/>
+            </a:solidFill>
+          </a:ln>
+          <a:effectLst/>
+        </p:spPr>
+        <p:style>
+          <a:lnRef idx="1">
+            <a:schemeClr val="accent4"/>
+          </a:lnRef>
+          <a:fillRef idx="2">
+            <a:schemeClr val="accent4"/>
+          </a:fillRef>
+          <a:effectRef idx="1">
+            <a:schemeClr val="accent4"/>
+          </a:effectRef>
+          <a:fontRef idx="minor">
+            <a:schemeClr val="dk1"/>
+          </a:fontRef>
+        </p:style>
+        <p:txBody>
+          <a:bodyPr rtlCol="0" anchor="ctr"/>
+          <a:lstStyle/>
+          <a:p>
+            <a:pPr algn="ctr"/>
+            <a:r>
+              <a:rPr lang="en-US" sz="1050" dirty="0">
+                <a:solidFill>
+                  <a:srgbClr val="7030A0"/>
+                </a:solidFill>
+              </a:rPr>
+              <a:t>Name</a:t>
+            </a:r>
+            <a:endParaRPr lang="en-SG" sz="1050" dirty="0">
+              <a:solidFill>
+                <a:srgbClr val="7030A0"/>
+              </a:solidFill>
+            </a:endParaRPr>
+          </a:p>
+        </p:txBody>
+      </p:sp>
+      <p:cxnSp>
+        <p:nvCxnSpPr>
+          <p:cNvPr id="132" name="Elbow Connector 78">
+            <a:extLst>
+              <a:ext uri="{FF2B5EF4-FFF2-40B4-BE49-F238E27FC236}">
+                <a16:creationId xmlns:a16="http://schemas.microsoft.com/office/drawing/2014/main" id="{249703C9-AD28-4DD2-9E1B-3743F853A933}"/>
+              </a:ext>
+            </a:extLst>
+          </p:cNvPr>
+          <p:cNvCxnSpPr>
+            <a:cxnSpLocks/>
+          </p:cNvCxnSpPr>
+          <p:nvPr/>
+        </p:nvCxnSpPr>
+        <p:spPr>
+          <a:xfrm flipV="1">
+            <a:off x="6343243" y="1099100"/>
+            <a:ext cx="434402" cy="327761"/>
+          </a:xfrm>
+          <a:prstGeom prst="bentConnector3">
+            <a:avLst/>
+          </a:prstGeom>
+          <a:ln w="19050">
+            <a:solidFill>
+              <a:srgbClr val="7030A0"/>
+            </a:solidFill>
+            <a:headEnd type="none" w="med" len="med"/>
+            <a:tailEnd type="arrow" w="med" len="med"/>
+          </a:ln>
+          <a:effectLst/>
+        </p:spPr>
+        <p:style>
+          <a:lnRef idx="1">
+            <a:schemeClr val="accent2"/>
+          </a:lnRef>
+          <a:fillRef idx="2">
+            <a:schemeClr val="accent2"/>
+          </a:fillRef>
+          <a:effectRef idx="1">
+            <a:schemeClr val="accent2"/>
+          </a:effectRef>
+          <a:fontRef idx="minor">
+            <a:schemeClr val="dk1"/>
+          </a:fontRef>
+        </p:style>
+      </p:cxnSp>
+      <p:sp>
+        <p:nvSpPr>
+          <p:cNvPr id="133" name="Rectangle 8">
+            <a:extLst>
+              <a:ext uri="{FF2B5EF4-FFF2-40B4-BE49-F238E27FC236}">
+                <a16:creationId xmlns:a16="http://schemas.microsoft.com/office/drawing/2014/main" id="{34530FB8-4529-4B15-B723-F79A6C6E7A54}"/>
+              </a:ext>
+            </a:extLst>
+          </p:cNvPr>
+          <p:cNvSpPr/>
+          <p:nvPr/>
+        </p:nvSpPr>
+        <p:spPr>
+          <a:xfrm>
+            <a:off x="6777644" y="1279495"/>
+            <a:ext cx="893949" cy="285783"/>
+          </a:xfrm>
+          <a:prstGeom prst="rect">
+            <a:avLst/>
+          </a:prstGeom>
+          <a:ln w="19050">
+            <a:solidFill>
+              <a:srgbClr val="7030A0"/>
+            </a:solidFill>
+          </a:ln>
+          <a:effectLst/>
+        </p:spPr>
+        <p:style>
+          <a:lnRef idx="1">
+            <a:schemeClr val="accent4"/>
+          </a:lnRef>
+          <a:fillRef idx="2">
+            <a:schemeClr val="accent4"/>
+          </a:fillRef>
+          <a:effectRef idx="1">
+            <a:schemeClr val="accent4"/>
+          </a:effectRef>
+          <a:fontRef idx="minor">
+            <a:schemeClr val="dk1"/>
+          </a:fontRef>
+        </p:style>
+        <p:txBody>
+          <a:bodyPr rtlCol="0" anchor="ctr"/>
+          <a:lstStyle/>
+          <a:p>
+            <a:pPr algn="ctr"/>
+            <a:r>
+              <a:rPr lang="en-US" sz="1050" dirty="0">
+                <a:solidFill>
+                  <a:srgbClr val="7030A0"/>
+                </a:solidFill>
+              </a:rPr>
+              <a:t>Phone</a:t>
+            </a:r>
+            <a:endParaRPr lang="en-SG" sz="1050" dirty="0">
+              <a:solidFill>
+                <a:srgbClr val="7030A0"/>
+              </a:solidFill>
+            </a:endParaRPr>
+          </a:p>
+        </p:txBody>
+      </p:sp>
+      <p:cxnSp>
+        <p:nvCxnSpPr>
+          <p:cNvPr id="134" name="Elbow Connector 80">
+            <a:extLst>
+              <a:ext uri="{FF2B5EF4-FFF2-40B4-BE49-F238E27FC236}">
+                <a16:creationId xmlns:a16="http://schemas.microsoft.com/office/drawing/2014/main" id="{D03EB9E8-FCD8-4AD8-9832-C0E68A5F9BF3}"/>
+              </a:ext>
+            </a:extLst>
+          </p:cNvPr>
+          <p:cNvCxnSpPr>
+            <a:cxnSpLocks/>
+            <a:endCxn id="133" idx="1"/>
+          </p:cNvCxnSpPr>
+          <p:nvPr/>
+        </p:nvCxnSpPr>
+        <p:spPr>
+          <a:xfrm flipV="1">
+            <a:off x="6343243" y="1422387"/>
+            <a:ext cx="434401" cy="4783"/>
+          </a:xfrm>
+          <a:prstGeom prst="bentConnector3">
+            <a:avLst/>
+          </a:prstGeom>
+          <a:ln w="19050">
+            <a:solidFill>
+              <a:srgbClr val="7030A0"/>
+            </a:solidFill>
+            <a:headEnd type="none" w="med" len="med"/>
+            <a:tailEnd type="arrow" w="med" len="med"/>
+          </a:ln>
+          <a:effectLst/>
+        </p:spPr>
+        <p:style>
+          <a:lnRef idx="1">
+            <a:schemeClr val="accent2"/>
+          </a:lnRef>
+          <a:fillRef idx="2">
+            <a:schemeClr val="accent2"/>
+          </a:fillRef>
+          <a:effectRef idx="1">
+            <a:schemeClr val="accent2"/>
+          </a:effectRef>
+          <a:fontRef idx="minor">
+            <a:schemeClr val="dk1"/>
+          </a:fontRef>
+        </p:style>
+      </p:cxnSp>
+      <p:sp>
+        <p:nvSpPr>
+          <p:cNvPr id="135" name="Rectangle 8">
+            <a:extLst>
+              <a:ext uri="{FF2B5EF4-FFF2-40B4-BE49-F238E27FC236}">
+                <a16:creationId xmlns:a16="http://schemas.microsoft.com/office/drawing/2014/main" id="{51191ECA-FFBC-4516-B46F-8D403D2A28D3}"/>
+              </a:ext>
+            </a:extLst>
+          </p:cNvPr>
+          <p:cNvSpPr/>
+          <p:nvPr/>
+        </p:nvSpPr>
+        <p:spPr>
+          <a:xfrm>
+            <a:off x="6777644" y="1602473"/>
+            <a:ext cx="893949" cy="285783"/>
+          </a:xfrm>
+          <a:prstGeom prst="rect">
+            <a:avLst/>
+          </a:prstGeom>
+          <a:ln w="19050">
+            <a:solidFill>
+              <a:srgbClr val="7030A0"/>
+            </a:solidFill>
+          </a:ln>
+          <a:effectLst/>
+        </p:spPr>
+        <p:style>
+          <a:lnRef idx="1">
+            <a:schemeClr val="accent4"/>
+          </a:lnRef>
+          <a:fillRef idx="2">
+            <a:schemeClr val="accent4"/>
+          </a:fillRef>
+          <a:effectRef idx="1">
+            <a:schemeClr val="accent4"/>
+          </a:effectRef>
+          <a:fontRef idx="minor">
+            <a:schemeClr val="dk1"/>
+          </a:fontRef>
+        </p:style>
+        <p:txBody>
+          <a:bodyPr rtlCol="0" anchor="ctr"/>
+          <a:lstStyle/>
+          <a:p>
+            <a:pPr algn="ctr"/>
+            <a:r>
+              <a:rPr lang="en-US" sz="1050" dirty="0">
+                <a:solidFill>
+                  <a:srgbClr val="7030A0"/>
+                </a:solidFill>
+              </a:rPr>
+              <a:t>Email</a:t>
+            </a:r>
+            <a:endParaRPr lang="en-SG" sz="1050" dirty="0">
+              <a:solidFill>
+                <a:srgbClr val="7030A0"/>
+              </a:solidFill>
+            </a:endParaRPr>
+          </a:p>
+        </p:txBody>
+      </p:sp>
+      <p:cxnSp>
+        <p:nvCxnSpPr>
+          <p:cNvPr id="136" name="Elbow Connector 83">
+            <a:extLst>
+              <a:ext uri="{FF2B5EF4-FFF2-40B4-BE49-F238E27FC236}">
+                <a16:creationId xmlns:a16="http://schemas.microsoft.com/office/drawing/2014/main" id="{EE2D9A4F-0BAB-4959-BB21-D1DB6987D7F2}"/>
+              </a:ext>
+            </a:extLst>
+          </p:cNvPr>
+          <p:cNvCxnSpPr>
+            <a:cxnSpLocks/>
+            <a:endCxn id="135" idx="1"/>
+          </p:cNvCxnSpPr>
+          <p:nvPr/>
+        </p:nvCxnSpPr>
+        <p:spPr>
+          <a:xfrm>
+            <a:off x="6343243" y="1427170"/>
+            <a:ext cx="434401" cy="318195"/>
+          </a:xfrm>
+          <a:prstGeom prst="bentConnector3">
+            <a:avLst/>
+          </a:prstGeom>
+          <a:ln w="19050">
+            <a:solidFill>
+              <a:srgbClr val="7030A0"/>
+            </a:solidFill>
+            <a:headEnd type="none" w="med" len="med"/>
+            <a:tailEnd type="arrow" w="med" len="med"/>
+          </a:ln>
+          <a:effectLst/>
+        </p:spPr>
+        <p:style>
+          <a:lnRef idx="1">
+            <a:schemeClr val="accent2"/>
+          </a:lnRef>
+          <a:fillRef idx="2">
+            <a:schemeClr val="accent2"/>
+          </a:fillRef>
+          <a:effectRef idx="1">
+            <a:schemeClr val="accent2"/>
+          </a:effectRef>
+          <a:fontRef idx="minor">
+            <a:schemeClr val="dk1"/>
+          </a:fontRef>
+        </p:style>
+      </p:cxnSp>
+      <p:sp>
+        <p:nvSpPr>
+          <p:cNvPr id="137" name="Rectangle 8">
+            <a:extLst>
+              <a:ext uri="{FF2B5EF4-FFF2-40B4-BE49-F238E27FC236}">
+                <a16:creationId xmlns:a16="http://schemas.microsoft.com/office/drawing/2014/main" id="{CF28F625-ED85-426D-9606-971500F8BD96}"/>
+              </a:ext>
+            </a:extLst>
+          </p:cNvPr>
+          <p:cNvSpPr/>
+          <p:nvPr/>
+        </p:nvSpPr>
+        <p:spPr>
+          <a:xfrm>
+            <a:off x="6777644" y="1925450"/>
+            <a:ext cx="893949" cy="285783"/>
+          </a:xfrm>
+          <a:prstGeom prst="rect">
+            <a:avLst/>
+          </a:prstGeom>
+          <a:ln w="19050">
+            <a:solidFill>
+              <a:srgbClr val="7030A0"/>
+            </a:solidFill>
+          </a:ln>
+          <a:effectLst/>
+        </p:spPr>
+        <p:style>
+          <a:lnRef idx="1">
+            <a:schemeClr val="accent4"/>
+          </a:lnRef>
+          <a:fillRef idx="2">
+            <a:schemeClr val="accent4"/>
+          </a:fillRef>
+          <a:effectRef idx="1">
+            <a:schemeClr val="accent4"/>
+          </a:effectRef>
+          <a:fontRef idx="minor">
+            <a:schemeClr val="dk1"/>
+          </a:fontRef>
+        </p:style>
+        <p:txBody>
+          <a:bodyPr rtlCol="0" anchor="ctr"/>
+          <a:lstStyle/>
+          <a:p>
+            <a:pPr algn="ctr"/>
+            <a:r>
+              <a:rPr lang="en-US" sz="1050" dirty="0">
+                <a:solidFill>
+                  <a:srgbClr val="7030A0"/>
+                </a:solidFill>
+              </a:rPr>
+              <a:t>Address</a:t>
+            </a:r>
+            <a:endParaRPr lang="en-SG" sz="1050" dirty="0">
+              <a:solidFill>
+                <a:srgbClr val="7030A0"/>
+              </a:solidFill>
+            </a:endParaRPr>
+          </a:p>
+        </p:txBody>
+      </p:sp>
+      <p:cxnSp>
+        <p:nvCxnSpPr>
+          <p:cNvPr id="138" name="Elbow Connector 85">
+            <a:extLst>
+              <a:ext uri="{FF2B5EF4-FFF2-40B4-BE49-F238E27FC236}">
+                <a16:creationId xmlns:a16="http://schemas.microsoft.com/office/drawing/2014/main" id="{C3DDF82B-F8AA-43AE-88E7-DC5E34E0F67A}"/>
+              </a:ext>
+            </a:extLst>
+          </p:cNvPr>
+          <p:cNvCxnSpPr>
+            <a:cxnSpLocks/>
+            <a:endCxn id="137" idx="1"/>
+          </p:cNvCxnSpPr>
+          <p:nvPr/>
+        </p:nvCxnSpPr>
+        <p:spPr>
+          <a:xfrm>
+            <a:off x="6343243" y="1427170"/>
+            <a:ext cx="434401" cy="641172"/>
+          </a:xfrm>
+          <a:prstGeom prst="bentConnector3">
+            <a:avLst/>
+          </a:prstGeom>
+          <a:ln w="19050">
+            <a:solidFill>
+              <a:srgbClr val="7030A0"/>
+            </a:solidFill>
+            <a:headEnd type="none" w="med" len="med"/>
+            <a:tailEnd type="arrow" w="med" len="med"/>
+          </a:ln>
+          <a:effectLst/>
+        </p:spPr>
+        <p:style>
+          <a:lnRef idx="1">
+            <a:schemeClr val="accent2"/>
+          </a:lnRef>
+          <a:fillRef idx="2">
+            <a:schemeClr val="accent2"/>
+          </a:fillRef>
+          <a:effectRef idx="1">
+            <a:schemeClr val="accent2"/>
+          </a:effectRef>
+          <a:fontRef idx="minor">
+            <a:schemeClr val="dk1"/>
+          </a:fontRef>
+        </p:style>
+      </p:cxnSp>
+      <p:sp>
+        <p:nvSpPr>
+          <p:cNvPr id="142" name="Rectangle 8">
+            <a:extLst>
+              <a:ext uri="{FF2B5EF4-FFF2-40B4-BE49-F238E27FC236}">
+                <a16:creationId xmlns:a16="http://schemas.microsoft.com/office/drawing/2014/main" id="{245C6C90-C68F-484F-B870-2AB7E790C1EE}"/>
+              </a:ext>
+            </a:extLst>
+          </p:cNvPr>
+          <p:cNvSpPr/>
+          <p:nvPr/>
+        </p:nvSpPr>
+        <p:spPr>
+          <a:xfrm>
+            <a:off x="6781900" y="2264115"/>
+            <a:ext cx="893949" cy="285783"/>
+          </a:xfrm>
+          <a:prstGeom prst="rect">
+            <a:avLst/>
+          </a:prstGeom>
+          <a:ln w="19050">
+            <a:solidFill>
+              <a:srgbClr val="7030A0"/>
+            </a:solidFill>
+          </a:ln>
+          <a:effectLst/>
+        </p:spPr>
+        <p:style>
+          <a:lnRef idx="1">
+            <a:schemeClr val="accent4"/>
+          </a:lnRef>
+          <a:fillRef idx="2">
+            <a:schemeClr val="accent4"/>
+          </a:fillRef>
+          <a:effectRef idx="1">
+            <a:schemeClr val="accent4"/>
+          </a:effectRef>
+          <a:fontRef idx="minor">
+            <a:schemeClr val="dk1"/>
+          </a:fontRef>
+        </p:style>
+        <p:txBody>
+          <a:bodyPr rtlCol="0" anchor="ctr"/>
+          <a:lstStyle/>
+          <a:p>
+            <a:pPr algn="ctr"/>
+            <a:r>
+              <a:rPr lang="en-US" sz="1050" dirty="0" err="1">
+                <a:solidFill>
+                  <a:srgbClr val="7030A0"/>
+                </a:solidFill>
+              </a:rPr>
+              <a:t>Nric</a:t>
+            </a:r>
+            <a:endParaRPr lang="en-SG" sz="1050" dirty="0">
+              <a:solidFill>
+                <a:srgbClr val="7030A0"/>
+              </a:solidFill>
+            </a:endParaRPr>
+          </a:p>
+        </p:txBody>
+      </p:sp>
+      <p:sp>
+        <p:nvSpPr>
+          <p:cNvPr id="143" name="Rectangle 8">
+            <a:extLst>
+              <a:ext uri="{FF2B5EF4-FFF2-40B4-BE49-F238E27FC236}">
+                <a16:creationId xmlns:a16="http://schemas.microsoft.com/office/drawing/2014/main" id="{B7A721A7-9254-4F7C-A223-B8DCFD9D7F6E}"/>
+              </a:ext>
+            </a:extLst>
+          </p:cNvPr>
+          <p:cNvSpPr/>
+          <p:nvPr/>
+        </p:nvSpPr>
+        <p:spPr>
+          <a:xfrm>
+            <a:off x="6777644" y="2599536"/>
+            <a:ext cx="893949" cy="285783"/>
+          </a:xfrm>
+          <a:prstGeom prst="rect">
+            <a:avLst/>
+          </a:prstGeom>
+          <a:ln w="19050">
+            <a:solidFill>
+              <a:srgbClr val="7030A0"/>
+            </a:solidFill>
+          </a:ln>
+          <a:effectLst/>
+        </p:spPr>
+        <p:style>
+          <a:lnRef idx="1">
+            <a:schemeClr val="accent4"/>
+          </a:lnRef>
+          <a:fillRef idx="2">
+            <a:schemeClr val="accent4"/>
+          </a:fillRef>
+          <a:effectRef idx="1">
+            <a:schemeClr val="accent4"/>
+          </a:effectRef>
+          <a:fontRef idx="minor">
+            <a:schemeClr val="dk1"/>
+          </a:fontRef>
+        </p:style>
+        <p:txBody>
+          <a:bodyPr rtlCol="0" anchor="ctr"/>
+          <a:lstStyle/>
+          <a:p>
+            <a:pPr algn="ctr"/>
+            <a:r>
+              <a:rPr lang="en-US" sz="1050" dirty="0">
+                <a:solidFill>
+                  <a:srgbClr val="7030A0"/>
+                </a:solidFill>
+              </a:rPr>
+              <a:t>Password</a:t>
+            </a:r>
+            <a:endParaRPr lang="en-SG" sz="1050" dirty="0">
+              <a:solidFill>
+                <a:srgbClr val="7030A0"/>
+              </a:solidFill>
+            </a:endParaRPr>
+          </a:p>
+        </p:txBody>
+      </p:sp>
+      <p:sp>
+        <p:nvSpPr>
+          <p:cNvPr id="144" name="Rectangle 8">
+            <a:extLst>
+              <a:ext uri="{FF2B5EF4-FFF2-40B4-BE49-F238E27FC236}">
+                <a16:creationId xmlns:a16="http://schemas.microsoft.com/office/drawing/2014/main" id="{9E36FDEA-64FA-474C-B436-E3259EFA5E78}"/>
+              </a:ext>
+            </a:extLst>
+          </p:cNvPr>
+          <p:cNvSpPr/>
+          <p:nvPr/>
+        </p:nvSpPr>
+        <p:spPr>
+          <a:xfrm>
+            <a:off x="6777644" y="612063"/>
+            <a:ext cx="893949" cy="285783"/>
+          </a:xfrm>
+          <a:prstGeom prst="rect">
+            <a:avLst/>
+          </a:prstGeom>
+          <a:ln w="19050">
+            <a:solidFill>
+              <a:srgbClr val="7030A0"/>
+            </a:solidFill>
+          </a:ln>
+          <a:effectLst/>
+        </p:spPr>
+        <p:style>
+          <a:lnRef idx="1">
+            <a:schemeClr val="accent4"/>
+          </a:lnRef>
+          <a:fillRef idx="2">
+            <a:schemeClr val="accent4"/>
+          </a:fillRef>
+          <a:effectRef idx="1">
+            <a:schemeClr val="accent4"/>
+          </a:effectRef>
+          <a:fontRef idx="minor">
+            <a:schemeClr val="dk1"/>
+          </a:fontRef>
+        </p:style>
+        <p:txBody>
+          <a:bodyPr rtlCol="0" anchor="ctr"/>
+          <a:lstStyle/>
+          <a:p>
+            <a:pPr algn="ctr"/>
+            <a:r>
+              <a:rPr lang="en-US" sz="1050" dirty="0">
+                <a:solidFill>
+                  <a:srgbClr val="7030A0"/>
+                </a:solidFill>
+              </a:rPr>
+              <a:t>Priority Level</a:t>
+            </a:r>
+            <a:endParaRPr lang="en-SG" sz="1050" dirty="0">
+              <a:solidFill>
+                <a:srgbClr val="7030A0"/>
+              </a:solidFill>
+            </a:endParaRPr>
+          </a:p>
+        </p:txBody>
+      </p:sp>
+      <p:cxnSp>
+        <p:nvCxnSpPr>
+          <p:cNvPr id="145" name="Elbow Connector 78">
+            <a:extLst>
+              <a:ext uri="{FF2B5EF4-FFF2-40B4-BE49-F238E27FC236}">
+                <a16:creationId xmlns:a16="http://schemas.microsoft.com/office/drawing/2014/main" id="{EBAB158B-30E4-4E61-B6C3-A4B6747CDF13}"/>
+              </a:ext>
+            </a:extLst>
+          </p:cNvPr>
+          <p:cNvCxnSpPr>
+            <a:cxnSpLocks/>
+            <a:endCxn id="144" idx="1"/>
+          </p:cNvCxnSpPr>
+          <p:nvPr/>
+        </p:nvCxnSpPr>
+        <p:spPr>
+          <a:xfrm rot="5400000" flipH="1" flipV="1">
+            <a:off x="6331575" y="980282"/>
+            <a:ext cx="671396" cy="220742"/>
+          </a:xfrm>
+          <a:prstGeom prst="bentConnector2">
+            <a:avLst/>
+          </a:prstGeom>
+          <a:ln w="19050">
+            <a:solidFill>
+              <a:srgbClr val="7030A0"/>
+            </a:solidFill>
+            <a:headEnd type="none" w="med" len="med"/>
+            <a:tailEnd type="arrow" w="med" len="med"/>
+          </a:ln>
+          <a:effectLst/>
+        </p:spPr>
+        <p:style>
+          <a:lnRef idx="1">
+            <a:schemeClr val="accent2"/>
+          </a:lnRef>
+          <a:fillRef idx="2">
+            <a:schemeClr val="accent2"/>
+          </a:fillRef>
+          <a:effectRef idx="1">
+            <a:schemeClr val="accent2"/>
+          </a:effectRef>
+          <a:fontRef idx="minor">
+            <a:schemeClr val="dk1"/>
+          </a:fontRef>
+        </p:style>
+      </p:cxnSp>
+      <p:cxnSp>
+        <p:nvCxnSpPr>
+          <p:cNvPr id="146" name="Elbow Connector 78">
+            <a:extLst>
+              <a:ext uri="{FF2B5EF4-FFF2-40B4-BE49-F238E27FC236}">
+                <a16:creationId xmlns:a16="http://schemas.microsoft.com/office/drawing/2014/main" id="{B4C1B832-5239-44E5-9898-355E7E8950BE}"/>
+              </a:ext>
+            </a:extLst>
+          </p:cNvPr>
+          <p:cNvCxnSpPr>
+            <a:cxnSpLocks/>
+            <a:endCxn id="142" idx="1"/>
+          </p:cNvCxnSpPr>
+          <p:nvPr/>
+        </p:nvCxnSpPr>
+        <p:spPr>
+          <a:xfrm>
+            <a:off x="6343243" y="1427170"/>
+            <a:ext cx="438657" cy="979837"/>
+          </a:xfrm>
+          <a:prstGeom prst="bentConnector3">
+            <a:avLst>
+              <a:gd name="adj1" fmla="val 50000"/>
+            </a:avLst>
+          </a:prstGeom>
+          <a:ln w="19050">
+            <a:solidFill>
+              <a:srgbClr val="7030A0"/>
+            </a:solidFill>
+            <a:headEnd type="none" w="med" len="med"/>
+            <a:tailEnd type="arrow" w="med" len="med"/>
+          </a:ln>
+          <a:effectLst/>
+        </p:spPr>
+        <p:style>
+          <a:lnRef idx="1">
+            <a:schemeClr val="accent2"/>
+          </a:lnRef>
+          <a:fillRef idx="2">
+            <a:schemeClr val="accent2"/>
+          </a:fillRef>
+          <a:effectRef idx="1">
+            <a:schemeClr val="accent2"/>
+          </a:effectRef>
+          <a:fontRef idx="minor">
+            <a:schemeClr val="dk1"/>
+          </a:fontRef>
+        </p:style>
+      </p:cxnSp>
+      <p:cxnSp>
+        <p:nvCxnSpPr>
+          <p:cNvPr id="147" name="Elbow Connector 78">
+            <a:extLst>
+              <a:ext uri="{FF2B5EF4-FFF2-40B4-BE49-F238E27FC236}">
+                <a16:creationId xmlns:a16="http://schemas.microsoft.com/office/drawing/2014/main" id="{999DB503-6569-42FA-ADBC-B24F248490CD}"/>
+              </a:ext>
+            </a:extLst>
+          </p:cNvPr>
+          <p:cNvCxnSpPr>
+            <a:cxnSpLocks/>
+            <a:endCxn id="143" idx="1"/>
+          </p:cNvCxnSpPr>
+          <p:nvPr/>
+        </p:nvCxnSpPr>
+        <p:spPr>
+          <a:xfrm>
+            <a:off x="6343243" y="1427170"/>
+            <a:ext cx="434401" cy="1315258"/>
+          </a:xfrm>
+          <a:prstGeom prst="bentConnector3">
+            <a:avLst>
+              <a:gd name="adj1" fmla="val 50000"/>
+            </a:avLst>
+          </a:prstGeom>
+          <a:ln w="19050">
+            <a:solidFill>
+              <a:srgbClr val="7030A0"/>
+            </a:solidFill>
+            <a:headEnd type="none" w="med" len="med"/>
+            <a:tailEnd type="arrow" w="med" len="med"/>
+          </a:ln>
+          <a:effectLst/>
+        </p:spPr>
+        <p:style>
+          <a:lnRef idx="1">
+            <a:schemeClr val="accent2"/>
+          </a:lnRef>
+          <a:fillRef idx="2">
+            <a:schemeClr val="accent2"/>
+          </a:fillRef>
+          <a:effectRef idx="1">
+            <a:schemeClr val="accent2"/>
+          </a:effectRef>
+          <a:fontRef idx="minor">
+            <a:schemeClr val="dk1"/>
+          </a:fontRef>
+        </p:style>
+      </p:cxnSp>
+      <p:sp>
+        <p:nvSpPr>
+          <p:cNvPr id="148" name="Rectangle 8">
+            <a:extLst>
+              <a:ext uri="{FF2B5EF4-FFF2-40B4-BE49-F238E27FC236}">
+                <a16:creationId xmlns:a16="http://schemas.microsoft.com/office/drawing/2014/main" id="{1AB21A20-5B87-4354-8B47-6BF3B6CFEAFB}"/>
+              </a:ext>
+            </a:extLst>
+          </p:cNvPr>
+          <p:cNvSpPr/>
+          <p:nvPr/>
+        </p:nvSpPr>
+        <p:spPr>
+          <a:xfrm>
+            <a:off x="6777644" y="2935207"/>
+            <a:ext cx="893949" cy="285783"/>
+          </a:xfrm>
+          <a:prstGeom prst="rect">
+            <a:avLst/>
+          </a:prstGeom>
+          <a:ln w="19050">
+            <a:solidFill>
+              <a:srgbClr val="7030A0"/>
+            </a:solidFill>
+          </a:ln>
+          <a:effectLst/>
+        </p:spPr>
+        <p:style>
+          <a:lnRef idx="1">
+            <a:schemeClr val="accent4"/>
+          </a:lnRef>
+          <a:fillRef idx="2">
+            <a:schemeClr val="accent4"/>
+          </a:fillRef>
+          <a:effectRef idx="1">
+            <a:schemeClr val="accent4"/>
+          </a:effectRef>
+          <a:fontRef idx="minor">
+            <a:schemeClr val="dk1"/>
+          </a:fontRef>
+        </p:style>
+        <p:txBody>
+          <a:bodyPr rtlCol="0" anchor="ctr"/>
+          <a:lstStyle/>
+          <a:p>
+            <a:pPr algn="ctr"/>
+            <a:r>
+              <a:rPr lang="en-US" sz="1050" dirty="0">
+                <a:solidFill>
+                  <a:srgbClr val="7030A0"/>
+                </a:solidFill>
+              </a:rPr>
+              <a:t>Department</a:t>
+            </a:r>
+            <a:endParaRPr lang="en-SG" sz="1050" dirty="0">
+              <a:solidFill>
+                <a:srgbClr val="7030A0"/>
+              </a:solidFill>
+            </a:endParaRPr>
+          </a:p>
+        </p:txBody>
+      </p:sp>
+      <p:cxnSp>
+        <p:nvCxnSpPr>
+          <p:cNvPr id="149" name="Elbow Connector 78">
+            <a:extLst>
+              <a:ext uri="{FF2B5EF4-FFF2-40B4-BE49-F238E27FC236}">
+                <a16:creationId xmlns:a16="http://schemas.microsoft.com/office/drawing/2014/main" id="{15AC0513-D218-407F-ACD0-02112C116EB3}"/>
+              </a:ext>
+            </a:extLst>
+          </p:cNvPr>
+          <p:cNvCxnSpPr>
+            <a:cxnSpLocks/>
+          </p:cNvCxnSpPr>
+          <p:nvPr/>
+        </p:nvCxnSpPr>
+        <p:spPr>
+          <a:xfrm>
+            <a:off x="6340415" y="1427170"/>
+            <a:ext cx="434401" cy="1650929"/>
+          </a:xfrm>
+          <a:prstGeom prst="bentConnector3">
+            <a:avLst>
+              <a:gd name="adj1" fmla="val 50000"/>
+            </a:avLst>
+          </a:prstGeom>
+          <a:ln w="19050">
+            <a:solidFill>
+              <a:srgbClr val="7030A0"/>
+            </a:solidFill>
+            <a:headEnd type="none" w="med" len="med"/>
+            <a:tailEnd type="arrow" w="med" len="med"/>
+          </a:ln>
+          <a:effectLst/>
+        </p:spPr>
+        <p:style>
+          <a:lnRef idx="1">
+            <a:schemeClr val="accent2"/>
+          </a:lnRef>
+          <a:fillRef idx="2">
+            <a:schemeClr val="accent2"/>
+          </a:fillRef>
+          <a:effectRef idx="1">
+            <a:schemeClr val="accent2"/>
+          </a:effectRef>
+          <a:fontRef idx="minor">
+            <a:schemeClr val="dk1"/>
+          </a:fontRef>
+        </p:style>
+      </p:cxnSp>
+      <p:sp>
+        <p:nvSpPr>
+          <p:cNvPr id="150" name="Rectangle 8">
+            <a:extLst>
+              <a:ext uri="{FF2B5EF4-FFF2-40B4-BE49-F238E27FC236}">
+                <a16:creationId xmlns:a16="http://schemas.microsoft.com/office/drawing/2014/main" id="{13DE9B99-032B-434D-B4C3-806449B6B73E}"/>
+              </a:ext>
+            </a:extLst>
+          </p:cNvPr>
+          <p:cNvSpPr/>
+          <p:nvPr/>
+        </p:nvSpPr>
+        <p:spPr>
+          <a:xfrm>
+            <a:off x="6781900" y="3270878"/>
+            <a:ext cx="893949" cy="285783"/>
+          </a:xfrm>
+          <a:prstGeom prst="rect">
+            <a:avLst/>
+          </a:prstGeom>
+          <a:ln w="19050">
+            <a:solidFill>
+              <a:srgbClr val="7030A0"/>
+            </a:solidFill>
+          </a:ln>
+          <a:effectLst/>
+        </p:spPr>
+        <p:style>
+          <a:lnRef idx="1">
+            <a:schemeClr val="accent4"/>
+          </a:lnRef>
+          <a:fillRef idx="2">
+            <a:schemeClr val="accent4"/>
+          </a:fillRef>
+          <a:effectRef idx="1">
+            <a:schemeClr val="accent4"/>
+          </a:effectRef>
+          <a:fontRef idx="minor">
+            <a:schemeClr val="dk1"/>
+          </a:fontRef>
+        </p:style>
+        <p:txBody>
+          <a:bodyPr rtlCol="0" anchor="ctr"/>
+          <a:lstStyle/>
+          <a:p>
+            <a:pPr algn="ctr"/>
+            <a:r>
+              <a:rPr lang="en-US" sz="1050" dirty="0">
+                <a:solidFill>
+                  <a:srgbClr val="7030A0"/>
+                </a:solidFill>
+              </a:rPr>
+              <a:t>Working Rate</a:t>
+            </a:r>
+            <a:endParaRPr lang="en-SG" sz="1050" dirty="0">
+              <a:solidFill>
+                <a:srgbClr val="7030A0"/>
+              </a:solidFill>
+            </a:endParaRPr>
+          </a:p>
+        </p:txBody>
+      </p:sp>
+      <p:sp>
+        <p:nvSpPr>
+          <p:cNvPr id="151" name="Rectangle 8">
+            <a:extLst>
+              <a:ext uri="{FF2B5EF4-FFF2-40B4-BE49-F238E27FC236}">
+                <a16:creationId xmlns:a16="http://schemas.microsoft.com/office/drawing/2014/main" id="{E321ACF6-DF23-4702-8EA3-4E0BE9BEA36B}"/>
+              </a:ext>
+            </a:extLst>
+          </p:cNvPr>
+          <p:cNvSpPr/>
+          <p:nvPr/>
+        </p:nvSpPr>
+        <p:spPr>
+          <a:xfrm>
+            <a:off x="6781899" y="3609423"/>
+            <a:ext cx="893949" cy="285783"/>
+          </a:xfrm>
+          <a:prstGeom prst="rect">
+            <a:avLst/>
+          </a:prstGeom>
+          <a:ln w="19050">
+            <a:solidFill>
+              <a:srgbClr val="7030A0"/>
+            </a:solidFill>
+          </a:ln>
+          <a:effectLst/>
+        </p:spPr>
+        <p:style>
+          <a:lnRef idx="1">
+            <a:schemeClr val="accent4"/>
+          </a:lnRef>
+          <a:fillRef idx="2">
+            <a:schemeClr val="accent4"/>
+          </a:fillRef>
+          <a:effectRef idx="1">
+            <a:schemeClr val="accent4"/>
+          </a:effectRef>
+          <a:fontRef idx="minor">
+            <a:schemeClr val="dk1"/>
+          </a:fontRef>
+        </p:style>
+        <p:txBody>
+          <a:bodyPr rtlCol="0" anchor="ctr"/>
+          <a:lstStyle/>
+          <a:p>
+            <a:pPr algn="ctr"/>
+            <a:r>
+              <a:rPr lang="en-US" sz="1050" dirty="0">
+                <a:solidFill>
+                  <a:srgbClr val="7030A0"/>
+                </a:solidFill>
+              </a:rPr>
+              <a:t>Checked In Time</a:t>
+            </a:r>
+            <a:endParaRPr lang="en-SG" sz="1050" dirty="0">
+              <a:solidFill>
+                <a:srgbClr val="7030A0"/>
+              </a:solidFill>
+            </a:endParaRPr>
+          </a:p>
+        </p:txBody>
+      </p:sp>
+      <p:sp>
+        <p:nvSpPr>
+          <p:cNvPr id="152" name="Rectangle 8">
+            <a:extLst>
+              <a:ext uri="{FF2B5EF4-FFF2-40B4-BE49-F238E27FC236}">
+                <a16:creationId xmlns:a16="http://schemas.microsoft.com/office/drawing/2014/main" id="{A11CFD9E-4561-40EC-9EB1-9BD869C474D7}"/>
+              </a:ext>
+            </a:extLst>
+          </p:cNvPr>
+          <p:cNvSpPr/>
+          <p:nvPr/>
+        </p:nvSpPr>
+        <p:spPr>
+          <a:xfrm>
+            <a:off x="6790056" y="3948088"/>
+            <a:ext cx="893949" cy="285783"/>
+          </a:xfrm>
+          <a:prstGeom prst="rect">
+            <a:avLst/>
+          </a:prstGeom>
+          <a:ln w="19050">
+            <a:solidFill>
+              <a:srgbClr val="7030A0"/>
+            </a:solidFill>
+          </a:ln>
+          <a:effectLst/>
+        </p:spPr>
+        <p:style>
+          <a:lnRef idx="1">
+            <a:schemeClr val="accent4"/>
+          </a:lnRef>
+          <a:fillRef idx="2">
+            <a:schemeClr val="accent4"/>
+          </a:fillRef>
+          <a:effectRef idx="1">
+            <a:schemeClr val="accent4"/>
+          </a:effectRef>
+          <a:fontRef idx="minor">
+            <a:schemeClr val="dk1"/>
+          </a:fontRef>
+        </p:style>
+        <p:txBody>
+          <a:bodyPr rtlCol="0" anchor="ctr"/>
+          <a:lstStyle/>
+          <a:p>
+            <a:pPr algn="ctr"/>
+            <a:r>
+              <a:rPr lang="en-US" sz="1050" dirty="0">
+                <a:solidFill>
+                  <a:srgbClr val="7030A0"/>
+                </a:solidFill>
+              </a:rPr>
+              <a:t>Mode</a:t>
+            </a:r>
+            <a:endParaRPr lang="en-SG" sz="1050" dirty="0">
+              <a:solidFill>
+                <a:srgbClr val="7030A0"/>
+              </a:solidFill>
+            </a:endParaRPr>
+          </a:p>
+        </p:txBody>
+      </p:sp>
+      <p:sp>
+        <p:nvSpPr>
+          <p:cNvPr id="153" name="Rectangle 8">
+            <a:extLst>
+              <a:ext uri="{FF2B5EF4-FFF2-40B4-BE49-F238E27FC236}">
+                <a16:creationId xmlns:a16="http://schemas.microsoft.com/office/drawing/2014/main" id="{8FF90966-5645-4A62-ADD9-94EC14264646}"/>
+              </a:ext>
+            </a:extLst>
+          </p:cNvPr>
+          <p:cNvSpPr/>
+          <p:nvPr/>
+        </p:nvSpPr>
+        <p:spPr>
+          <a:xfrm>
+            <a:off x="6781899" y="4283509"/>
+            <a:ext cx="893949" cy="285783"/>
+          </a:xfrm>
+          <a:prstGeom prst="rect">
+            <a:avLst/>
+          </a:prstGeom>
+          <a:ln w="19050">
+            <a:solidFill>
+              <a:srgbClr val="7030A0"/>
+            </a:solidFill>
+          </a:ln>
+          <a:effectLst/>
+        </p:spPr>
+        <p:style>
+          <a:lnRef idx="1">
+            <a:schemeClr val="accent4"/>
+          </a:lnRef>
+          <a:fillRef idx="2">
+            <a:schemeClr val="accent4"/>
+          </a:fillRef>
+          <a:effectRef idx="1">
+            <a:schemeClr val="accent4"/>
+          </a:effectRef>
+          <a:fontRef idx="minor">
+            <a:schemeClr val="dk1"/>
+          </a:fontRef>
+        </p:style>
+        <p:txBody>
+          <a:bodyPr rtlCol="0" anchor="ctr"/>
+          <a:lstStyle/>
+          <a:p>
+            <a:pPr algn="ctr"/>
+            <a:r>
+              <a:rPr lang="en-US" sz="1050" dirty="0">
+                <a:solidFill>
+                  <a:srgbClr val="7030A0"/>
+                </a:solidFill>
+              </a:rPr>
+              <a:t>Schedule</a:t>
+            </a:r>
+            <a:endParaRPr lang="en-SG" sz="1050" dirty="0">
+              <a:solidFill>
+                <a:srgbClr val="7030A0"/>
+              </a:solidFill>
+            </a:endParaRPr>
+          </a:p>
+        </p:txBody>
+      </p:sp>
+      <p:cxnSp>
+        <p:nvCxnSpPr>
+          <p:cNvPr id="154" name="Elbow Connector 78">
+            <a:extLst>
+              <a:ext uri="{FF2B5EF4-FFF2-40B4-BE49-F238E27FC236}">
+                <a16:creationId xmlns:a16="http://schemas.microsoft.com/office/drawing/2014/main" id="{B1D7842B-D7BC-4EBD-97B7-F008DF55F417}"/>
+              </a:ext>
+            </a:extLst>
+          </p:cNvPr>
+          <p:cNvCxnSpPr>
+            <a:cxnSpLocks/>
+            <a:endCxn id="150" idx="1"/>
+          </p:cNvCxnSpPr>
+          <p:nvPr/>
+        </p:nvCxnSpPr>
+        <p:spPr>
+          <a:xfrm rot="16200000" flipH="1">
+            <a:off x="5676459" y="2308329"/>
+            <a:ext cx="1986598" cy="224283"/>
+          </a:xfrm>
+          <a:prstGeom prst="bentConnector2">
+            <a:avLst/>
+          </a:prstGeom>
+          <a:ln w="19050">
+            <a:solidFill>
+              <a:srgbClr val="7030A0"/>
+            </a:solidFill>
+            <a:headEnd type="none" w="med" len="med"/>
+            <a:tailEnd type="arrow" w="med" len="med"/>
+          </a:ln>
+          <a:effectLst/>
+        </p:spPr>
+        <p:style>
+          <a:lnRef idx="1">
+            <a:schemeClr val="accent2"/>
+          </a:lnRef>
+          <a:fillRef idx="2">
+            <a:schemeClr val="accent2"/>
+          </a:fillRef>
+          <a:effectRef idx="1">
+            <a:schemeClr val="accent2"/>
+          </a:effectRef>
+          <a:fontRef idx="minor">
+            <a:schemeClr val="dk1"/>
+          </a:fontRef>
+        </p:style>
+      </p:cxnSp>
+      <p:cxnSp>
+        <p:nvCxnSpPr>
+          <p:cNvPr id="155" name="Elbow Connector 78">
+            <a:extLst>
+              <a:ext uri="{FF2B5EF4-FFF2-40B4-BE49-F238E27FC236}">
+                <a16:creationId xmlns:a16="http://schemas.microsoft.com/office/drawing/2014/main" id="{F7727806-3E1C-40EA-91E5-B6AAE7C3973C}"/>
+              </a:ext>
+            </a:extLst>
+          </p:cNvPr>
+          <p:cNvCxnSpPr>
+            <a:cxnSpLocks/>
+            <a:endCxn id="151" idx="1"/>
+          </p:cNvCxnSpPr>
+          <p:nvPr/>
+        </p:nvCxnSpPr>
+        <p:spPr>
+          <a:xfrm rot="16200000" flipH="1">
+            <a:off x="5583261" y="2553676"/>
+            <a:ext cx="2172993" cy="224283"/>
+          </a:xfrm>
+          <a:prstGeom prst="bentConnector2">
+            <a:avLst/>
+          </a:prstGeom>
+          <a:ln w="19050">
+            <a:solidFill>
+              <a:srgbClr val="7030A0"/>
+            </a:solidFill>
+            <a:headEnd type="none" w="med" len="med"/>
+            <a:tailEnd type="arrow" w="med" len="med"/>
+          </a:ln>
+          <a:effectLst/>
+        </p:spPr>
+        <p:style>
+          <a:lnRef idx="1">
+            <a:schemeClr val="accent2"/>
+          </a:lnRef>
+          <a:fillRef idx="2">
+            <a:schemeClr val="accent2"/>
+          </a:fillRef>
+          <a:effectRef idx="1">
+            <a:schemeClr val="accent2"/>
+          </a:effectRef>
+          <a:fontRef idx="minor">
+            <a:schemeClr val="dk1"/>
+          </a:fontRef>
+        </p:style>
+      </p:cxnSp>
+      <p:cxnSp>
+        <p:nvCxnSpPr>
+          <p:cNvPr id="156" name="Elbow Connector 78">
+            <a:extLst>
+              <a:ext uri="{FF2B5EF4-FFF2-40B4-BE49-F238E27FC236}">
+                <a16:creationId xmlns:a16="http://schemas.microsoft.com/office/drawing/2014/main" id="{25B351F1-A18E-4CAE-B05F-217DAE466D71}"/>
+              </a:ext>
+            </a:extLst>
+          </p:cNvPr>
+          <p:cNvCxnSpPr>
+            <a:cxnSpLocks/>
+          </p:cNvCxnSpPr>
+          <p:nvPr/>
+        </p:nvCxnSpPr>
+        <p:spPr>
+          <a:xfrm rot="16200000" flipH="1">
+            <a:off x="5676459" y="3001946"/>
+            <a:ext cx="1986598" cy="224283"/>
+          </a:xfrm>
+          <a:prstGeom prst="bentConnector2">
+            <a:avLst/>
+          </a:prstGeom>
+          <a:ln w="19050">
+            <a:solidFill>
+              <a:srgbClr val="7030A0"/>
+            </a:solidFill>
+            <a:headEnd type="none" w="med" len="med"/>
+            <a:tailEnd type="arrow" w="med" len="med"/>
+          </a:ln>
+          <a:effectLst/>
+        </p:spPr>
+        <p:style>
+          <a:lnRef idx="1">
+            <a:schemeClr val="accent2"/>
+          </a:lnRef>
+          <a:fillRef idx="2">
+            <a:schemeClr val="accent2"/>
+          </a:fillRef>
+          <a:effectRef idx="1">
+            <a:schemeClr val="accent2"/>
+          </a:effectRef>
+          <a:fontRef idx="minor">
+            <a:schemeClr val="dk1"/>
+          </a:fontRef>
+        </p:style>
+      </p:cxnSp>
+      <p:cxnSp>
+        <p:nvCxnSpPr>
+          <p:cNvPr id="157" name="Elbow Connector 78">
+            <a:extLst>
+              <a:ext uri="{FF2B5EF4-FFF2-40B4-BE49-F238E27FC236}">
+                <a16:creationId xmlns:a16="http://schemas.microsoft.com/office/drawing/2014/main" id="{925D4296-B95F-4D80-9FEB-3D8D09F6302A}"/>
+              </a:ext>
+            </a:extLst>
+          </p:cNvPr>
+          <p:cNvCxnSpPr>
+            <a:cxnSpLocks/>
+          </p:cNvCxnSpPr>
+          <p:nvPr/>
+        </p:nvCxnSpPr>
+        <p:spPr>
+          <a:xfrm rot="16200000" flipH="1">
+            <a:off x="5675745" y="3349483"/>
+            <a:ext cx="1986598" cy="224283"/>
+          </a:xfrm>
+          <a:prstGeom prst="bentConnector2">
+            <a:avLst/>
+          </a:prstGeom>
+          <a:ln w="19050">
+            <a:solidFill>
+              <a:srgbClr val="7030A0"/>
+            </a:solidFill>
+            <a:headEnd type="none" w="med" len="med"/>
+            <a:tailEnd type="arrow" w="med" len="med"/>
+          </a:ln>
+          <a:effectLst/>
+        </p:spPr>
+        <p:style>
+          <a:lnRef idx="1">
+            <a:schemeClr val="accent2"/>
+          </a:lnRef>
+          <a:fillRef idx="2">
+            <a:schemeClr val="accent2"/>
+          </a:fillRef>
+          <a:effectRef idx="1">
+            <a:schemeClr val="accent2"/>
+          </a:effectRef>
+          <a:fontRef idx="minor">
+            <a:schemeClr val="dk1"/>
+          </a:fontRef>
+        </p:style>
+      </p:cxnSp>
+      <p:sp>
+        <p:nvSpPr>
+          <p:cNvPr id="158" name="Rectangle 8">
+            <a:extLst>
+              <a:ext uri="{FF2B5EF4-FFF2-40B4-BE49-F238E27FC236}">
+                <a16:creationId xmlns:a16="http://schemas.microsoft.com/office/drawing/2014/main" id="{4F00455B-692B-4206-BFB0-78AF0522D045}"/>
+              </a:ext>
+            </a:extLst>
+          </p:cNvPr>
+          <p:cNvSpPr/>
+          <p:nvPr/>
+        </p:nvSpPr>
+        <p:spPr>
+          <a:xfrm>
+            <a:off x="7965554" y="4283509"/>
+            <a:ext cx="893949" cy="285783"/>
+          </a:xfrm>
+          <a:prstGeom prst="rect">
+            <a:avLst/>
+          </a:prstGeom>
+          <a:ln w="19050">
+            <a:solidFill>
+              <a:srgbClr val="7030A0"/>
+            </a:solidFill>
+          </a:ln>
+          <a:effectLst/>
+        </p:spPr>
+        <p:style>
+          <a:lnRef idx="1">
+            <a:schemeClr val="accent4"/>
+          </a:lnRef>
+          <a:fillRef idx="2">
+            <a:schemeClr val="accent4"/>
+          </a:fillRef>
+          <a:effectRef idx="1">
+            <a:schemeClr val="accent4"/>
+          </a:effectRef>
+          <a:fontRef idx="minor">
+            <a:schemeClr val="dk1"/>
+          </a:fontRef>
+        </p:style>
+        <p:txBody>
+          <a:bodyPr rtlCol="0" anchor="ctr"/>
+          <a:lstStyle/>
+          <a:p>
+            <a:pPr algn="ctr"/>
+            <a:r>
+              <a:rPr lang="en-US" sz="1050" dirty="0">
+                <a:solidFill>
+                  <a:srgbClr val="7030A0"/>
+                </a:solidFill>
+              </a:rPr>
+              <a:t>Venue</a:t>
+            </a:r>
+            <a:endParaRPr lang="en-SG" sz="1050" dirty="0">
+              <a:solidFill>
+                <a:srgbClr val="7030A0"/>
+              </a:solidFill>
+            </a:endParaRPr>
+          </a:p>
+        </p:txBody>
+      </p:sp>
+      <p:sp>
+        <p:nvSpPr>
+          <p:cNvPr id="159" name="Rectangle 8">
+            <a:extLst>
+              <a:ext uri="{FF2B5EF4-FFF2-40B4-BE49-F238E27FC236}">
+                <a16:creationId xmlns:a16="http://schemas.microsoft.com/office/drawing/2014/main" id="{37BF3A79-82C8-4DCB-A685-56CA15B228F5}"/>
+              </a:ext>
+            </a:extLst>
+          </p:cNvPr>
+          <p:cNvSpPr/>
+          <p:nvPr/>
+        </p:nvSpPr>
+        <p:spPr>
+          <a:xfrm>
+            <a:off x="7983018" y="4625860"/>
+            <a:ext cx="893949" cy="285783"/>
+          </a:xfrm>
+          <a:prstGeom prst="rect">
+            <a:avLst/>
+          </a:prstGeom>
+          <a:ln w="19050">
+            <a:solidFill>
+              <a:srgbClr val="7030A0"/>
+            </a:solidFill>
+          </a:ln>
+          <a:effectLst/>
+        </p:spPr>
+        <p:style>
+          <a:lnRef idx="1">
+            <a:schemeClr val="accent4"/>
+          </a:lnRef>
+          <a:fillRef idx="2">
+            <a:schemeClr val="accent4"/>
+          </a:fillRef>
+          <a:effectRef idx="1">
+            <a:schemeClr val="accent4"/>
+          </a:effectRef>
+          <a:fontRef idx="minor">
+            <a:schemeClr val="dk1"/>
+          </a:fontRef>
+        </p:style>
+        <p:txBody>
+          <a:bodyPr rtlCol="0" anchor="ctr"/>
+          <a:lstStyle/>
+          <a:p>
+            <a:pPr algn="ctr"/>
+            <a:r>
+              <a:rPr lang="en-US" sz="1050" dirty="0">
+                <a:solidFill>
+                  <a:srgbClr val="7030A0"/>
+                </a:solidFill>
+              </a:rPr>
+              <a:t>Start Time</a:t>
+            </a:r>
+            <a:endParaRPr lang="en-SG" sz="1050" dirty="0">
+              <a:solidFill>
+                <a:srgbClr val="7030A0"/>
+              </a:solidFill>
+            </a:endParaRPr>
+          </a:p>
+        </p:txBody>
+      </p:sp>
+      <p:sp>
+        <p:nvSpPr>
+          <p:cNvPr id="160" name="Rectangle 8">
+            <a:extLst>
+              <a:ext uri="{FF2B5EF4-FFF2-40B4-BE49-F238E27FC236}">
+                <a16:creationId xmlns:a16="http://schemas.microsoft.com/office/drawing/2014/main" id="{08B58D87-4943-49EC-A6FA-5A79F6138B75}"/>
+              </a:ext>
+            </a:extLst>
+          </p:cNvPr>
+          <p:cNvSpPr/>
+          <p:nvPr/>
+        </p:nvSpPr>
+        <p:spPr>
+          <a:xfrm>
+            <a:off x="7967798" y="4980591"/>
+            <a:ext cx="893949" cy="285783"/>
+          </a:xfrm>
+          <a:prstGeom prst="rect">
+            <a:avLst/>
+          </a:prstGeom>
+          <a:ln w="19050">
+            <a:solidFill>
+              <a:srgbClr val="7030A0"/>
+            </a:solidFill>
+          </a:ln>
+          <a:effectLst/>
+        </p:spPr>
+        <p:style>
+          <a:lnRef idx="1">
+            <a:schemeClr val="accent4"/>
+          </a:lnRef>
+          <a:fillRef idx="2">
+            <a:schemeClr val="accent4"/>
+          </a:fillRef>
+          <a:effectRef idx="1">
+            <a:schemeClr val="accent4"/>
+          </a:effectRef>
+          <a:fontRef idx="minor">
+            <a:schemeClr val="dk1"/>
+          </a:fontRef>
+        </p:style>
+        <p:txBody>
+          <a:bodyPr rtlCol="0" anchor="ctr"/>
+          <a:lstStyle/>
+          <a:p>
+            <a:pPr algn="ctr"/>
+            <a:r>
+              <a:rPr lang="en-US" sz="1050" dirty="0">
+                <a:solidFill>
+                  <a:srgbClr val="7030A0"/>
+                </a:solidFill>
+              </a:rPr>
+              <a:t>End Time</a:t>
+            </a:r>
+            <a:endParaRPr lang="en-SG" sz="1050" dirty="0">
+              <a:solidFill>
+                <a:srgbClr val="7030A0"/>
+              </a:solidFill>
+            </a:endParaRPr>
+          </a:p>
+        </p:txBody>
+      </p:sp>
+      <p:cxnSp>
+        <p:nvCxnSpPr>
+          <p:cNvPr id="161" name="Straight Arrow Connector 160">
+            <a:extLst>
+              <a:ext uri="{FF2B5EF4-FFF2-40B4-BE49-F238E27FC236}">
+                <a16:creationId xmlns:a16="http://schemas.microsoft.com/office/drawing/2014/main" id="{41DC9378-6F91-456B-B069-CDF9FA485B4B}"/>
+              </a:ext>
+            </a:extLst>
+          </p:cNvPr>
+          <p:cNvCxnSpPr>
+            <a:stCxn id="153" idx="3"/>
+            <a:endCxn id="158" idx="1"/>
+          </p:cNvCxnSpPr>
+          <p:nvPr/>
+        </p:nvCxnSpPr>
+        <p:spPr>
+          <a:xfrm>
+            <a:off x="7675848" y="4426401"/>
+            <a:ext cx="289706" cy="0"/>
+          </a:xfrm>
+          <a:prstGeom prst="straightConnector1">
+            <a:avLst/>
+          </a:prstGeom>
+          <a:ln w="19050">
+            <a:solidFill>
+              <a:srgbClr val="7030A0"/>
+            </a:solidFill>
+            <a:headEnd type="none" w="med" len="med"/>
+            <a:tailEnd type="arrow" w="med" len="med"/>
+          </a:ln>
+          <a:effectLst/>
+        </p:spPr>
+        <p:style>
+          <a:lnRef idx="1">
+            <a:schemeClr val="accent2"/>
+          </a:lnRef>
+          <a:fillRef idx="2">
+            <a:schemeClr val="accent2"/>
+          </a:fillRef>
+          <a:effectRef idx="1">
+            <a:schemeClr val="accent2"/>
+          </a:effectRef>
+          <a:fontRef idx="minor">
+            <a:schemeClr val="dk1"/>
+          </a:fontRef>
+        </p:style>
+      </p:cxnSp>
+      <p:cxnSp>
+        <p:nvCxnSpPr>
+          <p:cNvPr id="162" name="Straight Arrow Connector 161">
+            <a:extLst>
+              <a:ext uri="{FF2B5EF4-FFF2-40B4-BE49-F238E27FC236}">
+                <a16:creationId xmlns:a16="http://schemas.microsoft.com/office/drawing/2014/main" id="{94FAB27A-8702-42BF-90CD-9FC3C63339E6}"/>
+              </a:ext>
+            </a:extLst>
+          </p:cNvPr>
+          <p:cNvCxnSpPr/>
+          <p:nvPr/>
+        </p:nvCxnSpPr>
+        <p:spPr>
+          <a:xfrm>
+            <a:off x="7758736" y="4768751"/>
+            <a:ext cx="224282" cy="0"/>
+          </a:xfrm>
+          <a:prstGeom prst="straightConnector1">
+            <a:avLst/>
+          </a:prstGeom>
+          <a:ln w="19050">
+            <a:solidFill>
+              <a:srgbClr val="7030A0"/>
+            </a:solidFill>
+            <a:headEnd type="none" w="med" len="med"/>
+            <a:tailEnd type="arrow" w="med" len="med"/>
+          </a:ln>
+          <a:effectLst/>
+        </p:spPr>
+        <p:style>
+          <a:lnRef idx="1">
+            <a:schemeClr val="accent2"/>
+          </a:lnRef>
+          <a:fillRef idx="2">
+            <a:schemeClr val="accent2"/>
+          </a:fillRef>
+          <a:effectRef idx="1">
+            <a:schemeClr val="accent2"/>
+          </a:effectRef>
+          <a:fontRef idx="minor">
+            <a:schemeClr val="dk1"/>
+          </a:fontRef>
+        </p:style>
+      </p:cxnSp>
+      <p:cxnSp>
+        <p:nvCxnSpPr>
+          <p:cNvPr id="163" name="Straight Arrow Connector 162">
+            <a:extLst>
+              <a:ext uri="{FF2B5EF4-FFF2-40B4-BE49-F238E27FC236}">
+                <a16:creationId xmlns:a16="http://schemas.microsoft.com/office/drawing/2014/main" id="{6D465762-8670-4F29-B7EC-FCCE16422899}"/>
+              </a:ext>
+            </a:extLst>
+          </p:cNvPr>
+          <p:cNvCxnSpPr/>
+          <p:nvPr/>
+        </p:nvCxnSpPr>
+        <p:spPr>
+          <a:xfrm>
+            <a:off x="7741272" y="5123482"/>
+            <a:ext cx="224282" cy="0"/>
+          </a:xfrm>
+          <a:prstGeom prst="straightConnector1">
+            <a:avLst/>
+          </a:prstGeom>
+          <a:ln w="19050">
+            <a:solidFill>
+              <a:srgbClr val="7030A0"/>
+            </a:solidFill>
+            <a:headEnd type="none" w="med" len="med"/>
+            <a:tailEnd type="arrow" w="med" len="med"/>
+          </a:ln>
+          <a:effectLst/>
+        </p:spPr>
+        <p:style>
+          <a:lnRef idx="1">
+            <a:schemeClr val="accent2"/>
+          </a:lnRef>
+          <a:fillRef idx="2">
+            <a:schemeClr val="accent2"/>
+          </a:fillRef>
+          <a:effectRef idx="1">
+            <a:schemeClr val="accent2"/>
+          </a:effectRef>
+          <a:fontRef idx="minor">
+            <a:schemeClr val="dk1"/>
+          </a:fontRef>
+        </p:style>
+      </p:cxnSp>
+      <p:cxnSp>
+        <p:nvCxnSpPr>
+          <p:cNvPr id="164" name="Straight Connector 163">
+            <a:extLst>
+              <a:ext uri="{FF2B5EF4-FFF2-40B4-BE49-F238E27FC236}">
+                <a16:creationId xmlns:a16="http://schemas.microsoft.com/office/drawing/2014/main" id="{CC7D2CF6-38A2-47AE-932E-8353C821A99C}"/>
+              </a:ext>
+            </a:extLst>
+          </p:cNvPr>
+          <p:cNvCxnSpPr/>
+          <p:nvPr/>
+        </p:nvCxnSpPr>
+        <p:spPr>
+          <a:xfrm>
+            <a:off x="7741272" y="4426400"/>
+            <a:ext cx="0" cy="697082"/>
+          </a:xfrm>
+          <a:prstGeom prst="line">
+            <a:avLst/>
+          </a:prstGeom>
+          <a:effectLst/>
+        </p:spPr>
+        <p:style>
+          <a:lnRef idx="2">
+            <a:schemeClr val="accent4"/>
+          </a:lnRef>
+          <a:fillRef idx="0">
+            <a:schemeClr val="accent4"/>
+          </a:fillRef>
+          <a:effectRef idx="1">
+            <a:schemeClr val="accent4"/>
+          </a:effectRef>
+          <a:fontRef idx="minor">
+            <a:schemeClr val="tx1"/>
           </a:fontRef>
         </p:style>
       </p:cxnSp>

</xml_diff>